<commit_message>
Add slides for examples
</commit_message>
<xml_diff>
--- a/Let's React - Workshop.pptx
+++ b/Let's React - Workshop.pptx
@@ -5,7 +5,7 @@
     <p:sldMasterId id="2147483660" r:id="rId1"/>
   </p:sldMasterIdLst>
   <p:notesMasterIdLst>
-    <p:notesMasterId r:id="rId11"/>
+    <p:notesMasterId r:id="rId18"/>
   </p:notesMasterIdLst>
   <p:sldIdLst>
     <p:sldId id="256" r:id="rId2"/>
@@ -17,6 +17,13 @@
     <p:sldId id="262" r:id="rId8"/>
     <p:sldId id="263" r:id="rId9"/>
     <p:sldId id="264" r:id="rId10"/>
+    <p:sldId id="265" r:id="rId11"/>
+    <p:sldId id="266" r:id="rId12"/>
+    <p:sldId id="268" r:id="rId13"/>
+    <p:sldId id="269" r:id="rId14"/>
+    <p:sldId id="270" r:id="rId15"/>
+    <p:sldId id="271" r:id="rId16"/>
+    <p:sldId id="272" r:id="rId17"/>
   </p:sldIdLst>
   <p:sldSz cx="9215438" cy="5759450"/>
   <p:notesSz cx="6858000" cy="9144000"/>
@@ -205,7 +212,7 @@
           <a:p>
             <a:fld id="{5607E995-E625-1845-A9C2-A4586FF7C56A}" type="datetimeFigureOut">
               <a:rPr lang="en-US" smtClean="0"/>
-              <a:t>2/1/17</a:t>
+              <a:t>2/15/17</a:t>
             </a:fld>
             <a:endParaRPr lang="en-US"/>
           </a:p>
@@ -940,7 +947,7 @@
           <a:p>
             <a:fld id="{5F84E0A0-940C-2749-B2AE-B5697C37A241}" type="datetimeFigureOut">
               <a:rPr lang="en-US" smtClean="0"/>
-              <a:t>2/1/17</a:t>
+              <a:t>2/15/17</a:t>
             </a:fld>
             <a:endParaRPr lang="en-US"/>
           </a:p>
@@ -1117,7 +1124,7 @@
           <a:p>
             <a:fld id="{5F84E0A0-940C-2749-B2AE-B5697C37A241}" type="datetimeFigureOut">
               <a:rPr lang="en-US" smtClean="0"/>
-              <a:t>2/1/17</a:t>
+              <a:t>2/15/17</a:t>
             </a:fld>
             <a:endParaRPr lang="en-US"/>
           </a:p>
@@ -1297,7 +1304,7 @@
           <a:p>
             <a:fld id="{5F84E0A0-940C-2749-B2AE-B5697C37A241}" type="datetimeFigureOut">
               <a:rPr lang="en-US" smtClean="0"/>
-              <a:t>2/1/17</a:t>
+              <a:t>2/15/17</a:t>
             </a:fld>
             <a:endParaRPr lang="en-US"/>
           </a:p>
@@ -1736,7 +1743,7 @@
           <a:p>
             <a:fld id="{5F84E0A0-940C-2749-B2AE-B5697C37A241}" type="datetimeFigureOut">
               <a:rPr lang="en-US" smtClean="0"/>
-              <a:t>2/1/17</a:t>
+              <a:t>2/15/17</a:t>
             </a:fld>
             <a:endParaRPr lang="en-US"/>
           </a:p>
@@ -1975,7 +1982,7 @@
           <a:p>
             <a:fld id="{5F84E0A0-940C-2749-B2AE-B5697C37A241}" type="datetimeFigureOut">
               <a:rPr lang="en-US" smtClean="0"/>
-              <a:t>2/1/17</a:t>
+              <a:t>2/15/17</a:t>
             </a:fld>
             <a:endParaRPr lang="en-US"/>
           </a:p>
@@ -2349,7 +2356,7 @@
           <a:p>
             <a:fld id="{5F84E0A0-940C-2749-B2AE-B5697C37A241}" type="datetimeFigureOut">
               <a:rPr lang="en-US" smtClean="0"/>
-              <a:t>2/1/17</a:t>
+              <a:t>2/15/17</a:t>
             </a:fld>
             <a:endParaRPr lang="en-US"/>
           </a:p>
@@ -2474,7 +2481,7 @@
           <a:p>
             <a:fld id="{5F84E0A0-940C-2749-B2AE-B5697C37A241}" type="datetimeFigureOut">
               <a:rPr lang="en-US" smtClean="0"/>
-              <a:t>2/1/17</a:t>
+              <a:t>2/15/17</a:t>
             </a:fld>
             <a:endParaRPr lang="en-US"/>
           </a:p>
@@ -2569,7 +2576,7 @@
           <a:p>
             <a:fld id="{5F84E0A0-940C-2749-B2AE-B5697C37A241}" type="datetimeFigureOut">
               <a:rPr lang="en-US" smtClean="0"/>
-              <a:t>2/1/17</a:t>
+              <a:t>2/15/17</a:t>
             </a:fld>
             <a:endParaRPr lang="en-US"/>
           </a:p>
@@ -2846,7 +2853,7 @@
           <a:p>
             <a:fld id="{5F84E0A0-940C-2749-B2AE-B5697C37A241}" type="datetimeFigureOut">
               <a:rPr lang="en-US" smtClean="0"/>
-              <a:t>2/1/17</a:t>
+              <a:t>2/15/17</a:t>
             </a:fld>
             <a:endParaRPr lang="en-US"/>
           </a:p>
@@ -3103,7 +3110,7 @@
           <a:p>
             <a:fld id="{5F84E0A0-940C-2749-B2AE-B5697C37A241}" type="datetimeFigureOut">
               <a:rPr lang="en-US" smtClean="0"/>
-              <a:t>2/1/17</a:t>
+              <a:t>2/15/17</a:t>
             </a:fld>
             <a:endParaRPr lang="en-US"/>
           </a:p>
@@ -3316,7 +3323,7 @@
           <a:p>
             <a:fld id="{C764DE79-268F-4C1A-8933-263129D2AF90}" type="datetimeFigureOut">
               <a:rPr lang="en-US" dirty="0"/>
-              <a:t>2/1/17</a:t>
+              <a:t>2/15/17</a:t>
             </a:fld>
             <a:endParaRPr lang="en-US" dirty="0"/>
           </a:p>
@@ -4077,8 +4084,27 @@
                 <a:ea typeface="Montserrat Light" charset="0"/>
                 <a:cs typeface="Montserrat Light" charset="0"/>
               </a:rPr>
-              <a:t>/react-workshop</a:t>
-            </a:r>
+              <a:t>/react-</a:t>
+            </a:r>
+            <a:r>
+              <a:rPr lang="en-US" sz="1500" dirty="0" err="1" smtClean="0">
+                <a:solidFill>
+                  <a:schemeClr val="bg1"/>
+                </a:solidFill>
+                <a:latin typeface="Montserrat Light" charset="0"/>
+                <a:ea typeface="Montserrat Light" charset="0"/>
+                <a:cs typeface="Montserrat Light" charset="0"/>
+              </a:rPr>
+              <a:t>workshop.git</a:t>
+            </a:r>
+            <a:endParaRPr lang="en-US" sz="1500" dirty="0" smtClean="0">
+              <a:solidFill>
+                <a:schemeClr val="bg1"/>
+              </a:solidFill>
+              <a:latin typeface="Montserrat Light" charset="0"/>
+              <a:ea typeface="Montserrat Light" charset="0"/>
+              <a:cs typeface="Montserrat Light" charset="0"/>
+            </a:endParaRPr>
           </a:p>
         </p:txBody>
       </p:sp>
@@ -4099,6 +4125,3229 @@
       </p:par>
     </p:tnLst>
   </p:timing>
+</p:sld>
+</file>
+
+<file path=ppt/slides/slide10.xml><?xml version="1.0" encoding="utf-8"?>
+<p:sld xmlns:a="http://schemas.openxmlformats.org/drawingml/2006/main" xmlns:r="http://schemas.openxmlformats.org/officeDocument/2006/relationships" xmlns:p="http://schemas.openxmlformats.org/presentationml/2006/main">
+  <p:cSld>
+    <p:spTree>
+      <p:nvGrpSpPr>
+        <p:cNvPr id="1" name=""/>
+        <p:cNvGrpSpPr/>
+        <p:nvPr/>
+      </p:nvGrpSpPr>
+      <p:grpSpPr>
+        <a:xfrm>
+          <a:off x="0" y="0"/>
+          <a:ext cx="0" cy="0"/>
+          <a:chOff x="0" y="0"/>
+          <a:chExt cx="0" cy="0"/>
+        </a:xfrm>
+      </p:grpSpPr>
+      <p:sp>
+        <p:nvSpPr>
+          <p:cNvPr id="2" name="Title 1"/>
+          <p:cNvSpPr>
+            <a:spLocks noGrp="1"/>
+          </p:cNvSpPr>
+          <p:nvPr>
+            <p:ph type="title"/>
+          </p:nvPr>
+        </p:nvSpPr>
+        <p:spPr/>
+        <p:txBody>
+          <a:bodyPr/>
+          <a:lstStyle/>
+          <a:p>
+            <a:r>
+              <a:rPr lang="en-US" dirty="0" smtClean="0"/>
+              <a:t>Hello World Example</a:t>
+            </a:r>
+            <a:endParaRPr lang="en-US" dirty="0"/>
+          </a:p>
+        </p:txBody>
+      </p:sp>
+      <p:sp>
+        <p:nvSpPr>
+          <p:cNvPr id="5" name="Rectangle 4"/>
+          <p:cNvSpPr/>
+          <p:nvPr/>
+        </p:nvSpPr>
+        <p:spPr>
+          <a:xfrm>
+            <a:off x="2237028" y="1573703"/>
+            <a:ext cx="1743958" cy="509048"/>
+          </a:xfrm>
+          <a:prstGeom prst="rect">
+            <a:avLst/>
+          </a:prstGeom>
+          <a:ln>
+            <a:noFill/>
+          </a:ln>
+        </p:spPr>
+        <p:style>
+          <a:lnRef idx="2">
+            <a:schemeClr val="accent1">
+              <a:shade val="50000"/>
+            </a:schemeClr>
+          </a:lnRef>
+          <a:fillRef idx="1">
+            <a:schemeClr val="accent1"/>
+          </a:fillRef>
+          <a:effectRef idx="0">
+            <a:schemeClr val="accent1"/>
+          </a:effectRef>
+          <a:fontRef idx="minor">
+            <a:schemeClr val="lt1"/>
+          </a:fontRef>
+        </p:style>
+        <p:txBody>
+          <a:bodyPr rtlCol="0" anchor="ctr"/>
+          <a:lstStyle/>
+          <a:p>
+            <a:pPr algn="ctr"/>
+            <a:r>
+              <a:rPr lang="en-US" noProof="1" smtClean="0"/>
+              <a:t>&lt;HelloProps /&gt;</a:t>
+            </a:r>
+            <a:endParaRPr lang="en-US" noProof="1"/>
+          </a:p>
+        </p:txBody>
+      </p:sp>
+      <p:sp>
+        <p:nvSpPr>
+          <p:cNvPr id="6" name="Rectangle 5"/>
+          <p:cNvSpPr/>
+          <p:nvPr/>
+        </p:nvSpPr>
+        <p:spPr>
+          <a:xfrm>
+            <a:off x="5525680" y="1573703"/>
+            <a:ext cx="1743958" cy="509048"/>
+          </a:xfrm>
+          <a:prstGeom prst="rect">
+            <a:avLst/>
+          </a:prstGeom>
+          <a:ln>
+            <a:noFill/>
+          </a:ln>
+        </p:spPr>
+        <p:style>
+          <a:lnRef idx="2">
+            <a:schemeClr val="accent1">
+              <a:shade val="50000"/>
+            </a:schemeClr>
+          </a:lnRef>
+          <a:fillRef idx="1">
+            <a:schemeClr val="accent1"/>
+          </a:fillRef>
+          <a:effectRef idx="0">
+            <a:schemeClr val="accent1"/>
+          </a:effectRef>
+          <a:fontRef idx="minor">
+            <a:schemeClr val="lt1"/>
+          </a:fontRef>
+        </p:style>
+        <p:txBody>
+          <a:bodyPr rtlCol="0" anchor="ctr"/>
+          <a:lstStyle/>
+          <a:p>
+            <a:pPr algn="ctr"/>
+            <a:r>
+              <a:rPr lang="en-US" noProof="1" smtClean="0"/>
+              <a:t>&lt;</a:t>
+            </a:r>
+            <a:r>
+              <a:rPr lang="en-US" noProof="1" smtClean="0"/>
+              <a:t>HelloChildren </a:t>
+            </a:r>
+            <a:r>
+              <a:rPr lang="en-US" noProof="1" smtClean="0"/>
+              <a:t>/&gt;</a:t>
+            </a:r>
+            <a:endParaRPr lang="en-US" noProof="1"/>
+          </a:p>
+        </p:txBody>
+      </p:sp>
+      <p:grpSp>
+        <p:nvGrpSpPr>
+          <p:cNvPr id="10" name="Group 9"/>
+          <p:cNvGrpSpPr/>
+          <p:nvPr/>
+        </p:nvGrpSpPr>
+        <p:grpSpPr>
+          <a:xfrm>
+            <a:off x="2237028" y="2277877"/>
+            <a:ext cx="1743958" cy="923658"/>
+            <a:chOff x="1508289" y="2177590"/>
+            <a:chExt cx="1743958" cy="923658"/>
+          </a:xfrm>
+        </p:grpSpPr>
+        <p:sp>
+          <p:nvSpPr>
+            <p:cNvPr id="7" name="Rectangle 6"/>
+            <p:cNvSpPr/>
+            <p:nvPr/>
+          </p:nvSpPr>
+          <p:spPr>
+            <a:xfrm>
+              <a:off x="1508289" y="2290712"/>
+              <a:ext cx="1743958" cy="810536"/>
+            </a:xfrm>
+            <a:prstGeom prst="rect">
+              <a:avLst/>
+            </a:prstGeom>
+            <a:solidFill>
+              <a:schemeClr val="accent2">
+                <a:lumMod val="60000"/>
+                <a:lumOff val="40000"/>
+              </a:schemeClr>
+            </a:solidFill>
+            <a:ln>
+              <a:noFill/>
+            </a:ln>
+          </p:spPr>
+          <p:style>
+            <a:lnRef idx="2">
+              <a:schemeClr val="accent1">
+                <a:shade val="50000"/>
+              </a:schemeClr>
+            </a:lnRef>
+            <a:fillRef idx="1">
+              <a:schemeClr val="accent1"/>
+            </a:fillRef>
+            <a:effectRef idx="0">
+              <a:schemeClr val="accent1"/>
+            </a:effectRef>
+            <a:fontRef idx="minor">
+              <a:schemeClr val="lt1"/>
+            </a:fontRef>
+          </p:style>
+          <p:txBody>
+            <a:bodyPr vert="horz" lIns="90000" tIns="180000" rIns="90000" bIns="90000" rtlCol="0" anchor="t" anchorCtr="0"/>
+            <a:lstStyle/>
+            <a:p>
+              <a:pPr>
+                <a:lnSpc>
+                  <a:spcPts val="1800"/>
+                </a:lnSpc>
+              </a:pPr>
+              <a:r>
+                <a:rPr lang="sl-SI" dirty="0" smtClean="0"/>
+                <a:t>firstName: string</a:t>
+              </a:r>
+            </a:p>
+            <a:p>
+              <a:pPr>
+                <a:lnSpc>
+                  <a:spcPts val="1800"/>
+                </a:lnSpc>
+              </a:pPr>
+              <a:r>
+                <a:rPr lang="sl-SI" dirty="0" smtClean="0"/>
+                <a:t>lastName: string</a:t>
+              </a:r>
+              <a:endParaRPr dirty="0"/>
+            </a:p>
+          </p:txBody>
+        </p:sp>
+        <p:sp>
+          <p:nvSpPr>
+            <p:cNvPr id="9" name="Rectangle 8"/>
+            <p:cNvSpPr/>
+            <p:nvPr/>
+          </p:nvSpPr>
+          <p:spPr>
+            <a:xfrm>
+              <a:off x="1508289" y="2177590"/>
+              <a:ext cx="904973" cy="226243"/>
+            </a:xfrm>
+            <a:prstGeom prst="rect">
+              <a:avLst/>
+            </a:prstGeom>
+            <a:solidFill>
+              <a:schemeClr val="accent2"/>
+            </a:solidFill>
+            <a:ln>
+              <a:noFill/>
+            </a:ln>
+          </p:spPr>
+          <p:style>
+            <a:lnRef idx="2">
+              <a:schemeClr val="accent1">
+                <a:shade val="50000"/>
+              </a:schemeClr>
+            </a:lnRef>
+            <a:fillRef idx="1">
+              <a:schemeClr val="accent1"/>
+            </a:fillRef>
+            <a:effectRef idx="0">
+              <a:schemeClr val="accent1"/>
+            </a:effectRef>
+            <a:fontRef idx="minor">
+              <a:schemeClr val="lt1"/>
+            </a:fontRef>
+          </p:style>
+          <p:txBody>
+            <a:bodyPr rtlCol="0" anchor="ctr"/>
+            <a:lstStyle/>
+            <a:p>
+              <a:pPr algn="ctr"/>
+              <a:r>
+                <a:rPr lang="sl-SI" sz="1200" dirty="0" smtClean="0"/>
+                <a:t>props</a:t>
+              </a:r>
+              <a:endParaRPr sz="1200" dirty="0"/>
+            </a:p>
+          </p:txBody>
+        </p:sp>
+      </p:grpSp>
+      <p:grpSp>
+        <p:nvGrpSpPr>
+          <p:cNvPr id="11" name="Group 10"/>
+          <p:cNvGrpSpPr/>
+          <p:nvPr/>
+        </p:nvGrpSpPr>
+        <p:grpSpPr>
+          <a:xfrm>
+            <a:off x="5525680" y="2295275"/>
+            <a:ext cx="1743958" cy="648010"/>
+            <a:chOff x="1508289" y="2177590"/>
+            <a:chExt cx="1743958" cy="648010"/>
+          </a:xfrm>
+        </p:grpSpPr>
+        <p:sp>
+          <p:nvSpPr>
+            <p:cNvPr id="12" name="Rectangle 11"/>
+            <p:cNvSpPr/>
+            <p:nvPr/>
+          </p:nvSpPr>
+          <p:spPr>
+            <a:xfrm>
+              <a:off x="1508289" y="2290712"/>
+              <a:ext cx="1743958" cy="534888"/>
+            </a:xfrm>
+            <a:prstGeom prst="rect">
+              <a:avLst/>
+            </a:prstGeom>
+            <a:solidFill>
+              <a:schemeClr val="accent2">
+                <a:lumMod val="60000"/>
+                <a:lumOff val="40000"/>
+              </a:schemeClr>
+            </a:solidFill>
+            <a:ln>
+              <a:noFill/>
+            </a:ln>
+          </p:spPr>
+          <p:style>
+            <a:lnRef idx="2">
+              <a:schemeClr val="accent1">
+                <a:shade val="50000"/>
+              </a:schemeClr>
+            </a:lnRef>
+            <a:fillRef idx="1">
+              <a:schemeClr val="accent1"/>
+            </a:fillRef>
+            <a:effectRef idx="0">
+              <a:schemeClr val="accent1"/>
+            </a:effectRef>
+            <a:fontRef idx="minor">
+              <a:schemeClr val="lt1"/>
+            </a:fontRef>
+          </p:style>
+          <p:txBody>
+            <a:bodyPr vert="horz" lIns="90000" tIns="180000" rIns="90000" bIns="90000" rtlCol="0" anchor="t" anchorCtr="0"/>
+            <a:lstStyle/>
+            <a:p>
+              <a:pPr>
+                <a:lnSpc>
+                  <a:spcPts val="1800"/>
+                </a:lnSpc>
+              </a:pPr>
+              <a:r>
+                <a:rPr lang="sl-SI" dirty="0" smtClean="0"/>
+                <a:t>children: ?any</a:t>
+              </a:r>
+            </a:p>
+          </p:txBody>
+        </p:sp>
+        <p:sp>
+          <p:nvSpPr>
+            <p:cNvPr id="13" name="Rectangle 12"/>
+            <p:cNvSpPr/>
+            <p:nvPr/>
+          </p:nvSpPr>
+          <p:spPr>
+            <a:xfrm>
+              <a:off x="1508289" y="2177590"/>
+              <a:ext cx="904973" cy="226243"/>
+            </a:xfrm>
+            <a:prstGeom prst="rect">
+              <a:avLst/>
+            </a:prstGeom>
+            <a:solidFill>
+              <a:schemeClr val="accent2"/>
+            </a:solidFill>
+            <a:ln>
+              <a:noFill/>
+            </a:ln>
+          </p:spPr>
+          <p:style>
+            <a:lnRef idx="2">
+              <a:schemeClr val="accent1">
+                <a:shade val="50000"/>
+              </a:schemeClr>
+            </a:lnRef>
+            <a:fillRef idx="1">
+              <a:schemeClr val="accent1"/>
+            </a:fillRef>
+            <a:effectRef idx="0">
+              <a:schemeClr val="accent1"/>
+            </a:effectRef>
+            <a:fontRef idx="minor">
+              <a:schemeClr val="lt1"/>
+            </a:fontRef>
+          </p:style>
+          <p:txBody>
+            <a:bodyPr rtlCol="0" anchor="ctr"/>
+            <a:lstStyle/>
+            <a:p>
+              <a:pPr algn="ctr"/>
+              <a:r>
+                <a:rPr lang="sl-SI" sz="1200" dirty="0" smtClean="0"/>
+                <a:t>props</a:t>
+              </a:r>
+              <a:endParaRPr sz="1200" dirty="0"/>
+            </a:p>
+          </p:txBody>
+        </p:sp>
+      </p:grpSp>
+    </p:spTree>
+    <p:extLst>
+      <p:ext uri="{BB962C8B-B14F-4D97-AF65-F5344CB8AC3E}">
+        <p14:creationId xmlns:p14="http://schemas.microsoft.com/office/powerpoint/2010/main" val="1921810431"/>
+      </p:ext>
+    </p:extLst>
+  </p:cSld>
+  <p:clrMapOvr>
+    <a:masterClrMapping/>
+  </p:clrMapOvr>
+</p:sld>
+</file>
+
+<file path=ppt/slides/slide11.xml><?xml version="1.0" encoding="utf-8"?>
+<p:sld xmlns:a="http://schemas.openxmlformats.org/drawingml/2006/main" xmlns:r="http://schemas.openxmlformats.org/officeDocument/2006/relationships" xmlns:p="http://schemas.openxmlformats.org/presentationml/2006/main">
+  <p:cSld>
+    <p:spTree>
+      <p:nvGrpSpPr>
+        <p:cNvPr id="1" name=""/>
+        <p:cNvGrpSpPr/>
+        <p:nvPr/>
+      </p:nvGrpSpPr>
+      <p:grpSpPr>
+        <a:xfrm>
+          <a:off x="0" y="0"/>
+          <a:ext cx="0" cy="0"/>
+          <a:chOff x="0" y="0"/>
+          <a:chExt cx="0" cy="0"/>
+        </a:xfrm>
+      </p:grpSpPr>
+      <p:sp>
+        <p:nvSpPr>
+          <p:cNvPr id="2" name="Title 1"/>
+          <p:cNvSpPr>
+            <a:spLocks noGrp="1"/>
+          </p:cNvSpPr>
+          <p:nvPr>
+            <p:ph type="title"/>
+          </p:nvPr>
+        </p:nvSpPr>
+        <p:spPr/>
+        <p:txBody>
+          <a:bodyPr/>
+          <a:lstStyle/>
+          <a:p>
+            <a:r>
+              <a:rPr lang="en-US" dirty="0" smtClean="0"/>
+              <a:t>Click Counter Example</a:t>
+            </a:r>
+            <a:endParaRPr lang="en-US" dirty="0"/>
+          </a:p>
+        </p:txBody>
+      </p:sp>
+      <p:sp>
+        <p:nvSpPr>
+          <p:cNvPr id="5" name="Rectangle 4"/>
+          <p:cNvSpPr/>
+          <p:nvPr/>
+        </p:nvSpPr>
+        <p:spPr>
+          <a:xfrm>
+            <a:off x="3735740" y="1589633"/>
+            <a:ext cx="1743958" cy="509048"/>
+          </a:xfrm>
+          <a:prstGeom prst="rect">
+            <a:avLst/>
+          </a:prstGeom>
+          <a:ln>
+            <a:noFill/>
+          </a:ln>
+        </p:spPr>
+        <p:style>
+          <a:lnRef idx="2">
+            <a:schemeClr val="accent1">
+              <a:shade val="50000"/>
+            </a:schemeClr>
+          </a:lnRef>
+          <a:fillRef idx="1">
+            <a:schemeClr val="accent1"/>
+          </a:fillRef>
+          <a:effectRef idx="0">
+            <a:schemeClr val="accent1"/>
+          </a:effectRef>
+          <a:fontRef idx="minor">
+            <a:schemeClr val="lt1"/>
+          </a:fontRef>
+        </p:style>
+        <p:txBody>
+          <a:bodyPr rtlCol="0" anchor="ctr"/>
+          <a:lstStyle/>
+          <a:p>
+            <a:pPr algn="ctr"/>
+            <a:r>
+              <a:rPr lang="en-US" noProof="1" smtClean="0"/>
+              <a:t>&lt;ClickCounter /&gt;</a:t>
+            </a:r>
+            <a:endParaRPr lang="en-US" noProof="1"/>
+          </a:p>
+        </p:txBody>
+      </p:sp>
+      <p:grpSp>
+        <p:nvGrpSpPr>
+          <p:cNvPr id="10" name="Group 9"/>
+          <p:cNvGrpSpPr/>
+          <p:nvPr/>
+        </p:nvGrpSpPr>
+        <p:grpSpPr>
+          <a:xfrm>
+            <a:off x="3735740" y="2357453"/>
+            <a:ext cx="1942684" cy="705787"/>
+            <a:chOff x="1508289" y="2177590"/>
+            <a:chExt cx="1942684" cy="705787"/>
+          </a:xfrm>
+        </p:grpSpPr>
+        <p:sp>
+          <p:nvSpPr>
+            <p:cNvPr id="7" name="Rectangle 6"/>
+            <p:cNvSpPr/>
+            <p:nvPr/>
+          </p:nvSpPr>
+          <p:spPr>
+            <a:xfrm>
+              <a:off x="1508289" y="2290712"/>
+              <a:ext cx="1942684" cy="592665"/>
+            </a:xfrm>
+            <a:prstGeom prst="rect">
+              <a:avLst/>
+            </a:prstGeom>
+            <a:solidFill>
+              <a:schemeClr val="accent6">
+                <a:lumMod val="60000"/>
+                <a:lumOff val="40000"/>
+              </a:schemeClr>
+            </a:solidFill>
+            <a:ln>
+              <a:noFill/>
+            </a:ln>
+          </p:spPr>
+          <p:style>
+            <a:lnRef idx="2">
+              <a:schemeClr val="accent1">
+                <a:shade val="50000"/>
+              </a:schemeClr>
+            </a:lnRef>
+            <a:fillRef idx="1">
+              <a:schemeClr val="accent1"/>
+            </a:fillRef>
+            <a:effectRef idx="0">
+              <a:schemeClr val="accent1"/>
+            </a:effectRef>
+            <a:fontRef idx="minor">
+              <a:schemeClr val="lt1"/>
+            </a:fontRef>
+          </p:style>
+          <p:txBody>
+            <a:bodyPr vert="horz" lIns="90000" tIns="180000" rIns="90000" bIns="90000" rtlCol="0" anchor="t" anchorCtr="0"/>
+            <a:lstStyle/>
+            <a:p>
+              <a:pPr>
+                <a:lnSpc>
+                  <a:spcPts val="1800"/>
+                </a:lnSpc>
+              </a:pPr>
+              <a:r>
+                <a:rPr lang="sl-SI" dirty="0" smtClean="0"/>
+                <a:t>timesClicked: number</a:t>
+              </a:r>
+            </a:p>
+          </p:txBody>
+        </p:sp>
+        <p:sp>
+          <p:nvSpPr>
+            <p:cNvPr id="9" name="Rectangle 8"/>
+            <p:cNvSpPr/>
+            <p:nvPr/>
+          </p:nvSpPr>
+          <p:spPr>
+            <a:xfrm>
+              <a:off x="1508289" y="2177590"/>
+              <a:ext cx="904973" cy="226243"/>
+            </a:xfrm>
+            <a:prstGeom prst="rect">
+              <a:avLst/>
+            </a:prstGeom>
+            <a:solidFill>
+              <a:schemeClr val="accent6"/>
+            </a:solidFill>
+            <a:ln>
+              <a:noFill/>
+            </a:ln>
+          </p:spPr>
+          <p:style>
+            <a:lnRef idx="2">
+              <a:schemeClr val="accent1">
+                <a:shade val="50000"/>
+              </a:schemeClr>
+            </a:lnRef>
+            <a:fillRef idx="1">
+              <a:schemeClr val="accent1"/>
+            </a:fillRef>
+            <a:effectRef idx="0">
+              <a:schemeClr val="accent1"/>
+            </a:effectRef>
+            <a:fontRef idx="minor">
+              <a:schemeClr val="lt1"/>
+            </a:fontRef>
+          </p:style>
+          <p:txBody>
+            <a:bodyPr rtlCol="0" anchor="ctr"/>
+            <a:lstStyle/>
+            <a:p>
+              <a:pPr algn="ctr"/>
+              <a:r>
+                <a:rPr lang="sl-SI" sz="1200" dirty="0" smtClean="0"/>
+                <a:t>state</a:t>
+              </a:r>
+              <a:endParaRPr sz="1200" dirty="0"/>
+            </a:p>
+          </p:txBody>
+        </p:sp>
+      </p:grpSp>
+    </p:spTree>
+    <p:extLst>
+      <p:ext uri="{BB962C8B-B14F-4D97-AF65-F5344CB8AC3E}">
+        <p14:creationId xmlns:p14="http://schemas.microsoft.com/office/powerpoint/2010/main" val="2007281304"/>
+      </p:ext>
+    </p:extLst>
+  </p:cSld>
+  <p:clrMapOvr>
+    <a:masterClrMapping/>
+  </p:clrMapOvr>
+</p:sld>
+</file>
+
+<file path=ppt/slides/slide12.xml><?xml version="1.0" encoding="utf-8"?>
+<p:sld xmlns:a="http://schemas.openxmlformats.org/drawingml/2006/main" xmlns:r="http://schemas.openxmlformats.org/officeDocument/2006/relationships" xmlns:p="http://schemas.openxmlformats.org/presentationml/2006/main">
+  <p:cSld>
+    <p:spTree>
+      <p:nvGrpSpPr>
+        <p:cNvPr id="1" name=""/>
+        <p:cNvGrpSpPr/>
+        <p:nvPr/>
+      </p:nvGrpSpPr>
+      <p:grpSpPr>
+        <a:xfrm>
+          <a:off x="0" y="0"/>
+          <a:ext cx="0" cy="0"/>
+          <a:chOff x="0" y="0"/>
+          <a:chExt cx="0" cy="0"/>
+        </a:xfrm>
+      </p:grpSpPr>
+      <p:sp>
+        <p:nvSpPr>
+          <p:cNvPr id="2" name="Title 1"/>
+          <p:cNvSpPr>
+            <a:spLocks noGrp="1"/>
+          </p:cNvSpPr>
+          <p:nvPr>
+            <p:ph type="title"/>
+          </p:nvPr>
+        </p:nvSpPr>
+        <p:spPr/>
+        <p:txBody>
+          <a:bodyPr/>
+          <a:lstStyle/>
+          <a:p>
+            <a:r>
+              <a:rPr lang="en-US" dirty="0" smtClean="0"/>
+              <a:t>Stopwatch Example</a:t>
+            </a:r>
+            <a:endParaRPr lang="en-US" dirty="0"/>
+          </a:p>
+        </p:txBody>
+      </p:sp>
+      <p:sp>
+        <p:nvSpPr>
+          <p:cNvPr id="5" name="Rectangle 4"/>
+          <p:cNvSpPr/>
+          <p:nvPr/>
+        </p:nvSpPr>
+        <p:spPr>
+          <a:xfrm>
+            <a:off x="3735740" y="1589633"/>
+            <a:ext cx="1743958" cy="509048"/>
+          </a:xfrm>
+          <a:prstGeom prst="rect">
+            <a:avLst/>
+          </a:prstGeom>
+          <a:ln>
+            <a:noFill/>
+          </a:ln>
+        </p:spPr>
+        <p:style>
+          <a:lnRef idx="2">
+            <a:schemeClr val="accent1">
+              <a:shade val="50000"/>
+            </a:schemeClr>
+          </a:lnRef>
+          <a:fillRef idx="1">
+            <a:schemeClr val="accent1"/>
+          </a:fillRef>
+          <a:effectRef idx="0">
+            <a:schemeClr val="accent1"/>
+          </a:effectRef>
+          <a:fontRef idx="minor">
+            <a:schemeClr val="lt1"/>
+          </a:fontRef>
+        </p:style>
+        <p:txBody>
+          <a:bodyPr rtlCol="0" anchor="ctr"/>
+          <a:lstStyle/>
+          <a:p>
+            <a:pPr algn="ctr"/>
+            <a:r>
+              <a:rPr lang="en-US" noProof="1" smtClean="0"/>
+              <a:t>&lt;Stopwatch /&gt;</a:t>
+            </a:r>
+            <a:endParaRPr lang="en-US" noProof="1"/>
+          </a:p>
+        </p:txBody>
+      </p:sp>
+      <p:grpSp>
+        <p:nvGrpSpPr>
+          <p:cNvPr id="10" name="Group 9"/>
+          <p:cNvGrpSpPr/>
+          <p:nvPr/>
+        </p:nvGrpSpPr>
+        <p:grpSpPr>
+          <a:xfrm>
+            <a:off x="3735740" y="2357453"/>
+            <a:ext cx="1743958" cy="918642"/>
+            <a:chOff x="1508289" y="2177590"/>
+            <a:chExt cx="1743958" cy="918642"/>
+          </a:xfrm>
+        </p:grpSpPr>
+        <p:sp>
+          <p:nvSpPr>
+            <p:cNvPr id="7" name="Rectangle 6"/>
+            <p:cNvSpPr/>
+            <p:nvPr/>
+          </p:nvSpPr>
+          <p:spPr>
+            <a:xfrm>
+              <a:off x="1508289" y="2290712"/>
+              <a:ext cx="1743958" cy="805520"/>
+            </a:xfrm>
+            <a:prstGeom prst="rect">
+              <a:avLst/>
+            </a:prstGeom>
+            <a:solidFill>
+              <a:schemeClr val="accent6">
+                <a:lumMod val="60000"/>
+                <a:lumOff val="40000"/>
+              </a:schemeClr>
+            </a:solidFill>
+            <a:ln>
+              <a:noFill/>
+            </a:ln>
+          </p:spPr>
+          <p:style>
+            <a:lnRef idx="2">
+              <a:schemeClr val="accent1">
+                <a:shade val="50000"/>
+              </a:schemeClr>
+            </a:lnRef>
+            <a:fillRef idx="1">
+              <a:schemeClr val="accent1"/>
+            </a:fillRef>
+            <a:effectRef idx="0">
+              <a:schemeClr val="accent1"/>
+            </a:effectRef>
+            <a:fontRef idx="minor">
+              <a:schemeClr val="lt1"/>
+            </a:fontRef>
+          </p:style>
+          <p:txBody>
+            <a:bodyPr vert="horz" lIns="90000" tIns="180000" rIns="90000" bIns="90000" rtlCol="0" anchor="t" anchorCtr="0"/>
+            <a:lstStyle/>
+            <a:p>
+              <a:pPr>
+                <a:lnSpc>
+                  <a:spcPts val="1800"/>
+                </a:lnSpc>
+              </a:pPr>
+              <a:r>
+                <a:rPr lang="sl-SI" dirty="0" smtClean="0"/>
+                <a:t>time: number</a:t>
+              </a:r>
+            </a:p>
+            <a:p>
+              <a:pPr>
+                <a:lnSpc>
+                  <a:spcPts val="1800"/>
+                </a:lnSpc>
+              </a:pPr>
+              <a:r>
+                <a:rPr lang="sl-SI" dirty="0" smtClean="0"/>
+                <a:t>timing: boolean</a:t>
+              </a:r>
+            </a:p>
+          </p:txBody>
+        </p:sp>
+        <p:sp>
+          <p:nvSpPr>
+            <p:cNvPr id="9" name="Rectangle 8"/>
+            <p:cNvSpPr/>
+            <p:nvPr/>
+          </p:nvSpPr>
+          <p:spPr>
+            <a:xfrm>
+              <a:off x="1508289" y="2177590"/>
+              <a:ext cx="904973" cy="226243"/>
+            </a:xfrm>
+            <a:prstGeom prst="rect">
+              <a:avLst/>
+            </a:prstGeom>
+            <a:solidFill>
+              <a:schemeClr val="accent6"/>
+            </a:solidFill>
+            <a:ln>
+              <a:noFill/>
+            </a:ln>
+          </p:spPr>
+          <p:style>
+            <a:lnRef idx="2">
+              <a:schemeClr val="accent1">
+                <a:shade val="50000"/>
+              </a:schemeClr>
+            </a:lnRef>
+            <a:fillRef idx="1">
+              <a:schemeClr val="accent1"/>
+            </a:fillRef>
+            <a:effectRef idx="0">
+              <a:schemeClr val="accent1"/>
+            </a:effectRef>
+            <a:fontRef idx="minor">
+              <a:schemeClr val="lt1"/>
+            </a:fontRef>
+          </p:style>
+          <p:txBody>
+            <a:bodyPr rtlCol="0" anchor="ctr"/>
+            <a:lstStyle/>
+            <a:p>
+              <a:pPr algn="ctr"/>
+              <a:r>
+                <a:rPr lang="sl-SI" sz="1200" dirty="0" smtClean="0"/>
+                <a:t>state</a:t>
+              </a:r>
+              <a:endParaRPr sz="1200" dirty="0"/>
+            </a:p>
+          </p:txBody>
+        </p:sp>
+      </p:grpSp>
+    </p:spTree>
+    <p:extLst>
+      <p:ext uri="{BB962C8B-B14F-4D97-AF65-F5344CB8AC3E}">
+        <p14:creationId xmlns:p14="http://schemas.microsoft.com/office/powerpoint/2010/main" val="254137964"/>
+      </p:ext>
+    </p:extLst>
+  </p:cSld>
+  <p:clrMapOvr>
+    <a:masterClrMapping/>
+  </p:clrMapOvr>
+</p:sld>
+</file>
+
+<file path=ppt/slides/slide13.xml><?xml version="1.0" encoding="utf-8"?>
+<p:sld xmlns:a="http://schemas.openxmlformats.org/drawingml/2006/main" xmlns:r="http://schemas.openxmlformats.org/officeDocument/2006/relationships" xmlns:p="http://schemas.openxmlformats.org/presentationml/2006/main">
+  <p:cSld>
+    <p:spTree>
+      <p:nvGrpSpPr>
+        <p:cNvPr id="1" name=""/>
+        <p:cNvGrpSpPr/>
+        <p:nvPr/>
+      </p:nvGrpSpPr>
+      <p:grpSpPr>
+        <a:xfrm>
+          <a:off x="0" y="0"/>
+          <a:ext cx="0" cy="0"/>
+          <a:chOff x="0" y="0"/>
+          <a:chExt cx="0" cy="0"/>
+        </a:xfrm>
+      </p:grpSpPr>
+      <p:sp>
+        <p:nvSpPr>
+          <p:cNvPr id="2" name="Title 1"/>
+          <p:cNvSpPr>
+            <a:spLocks noGrp="1"/>
+          </p:cNvSpPr>
+          <p:nvPr>
+            <p:ph type="title"/>
+          </p:nvPr>
+        </p:nvSpPr>
+        <p:spPr/>
+        <p:txBody>
+          <a:bodyPr/>
+          <a:lstStyle/>
+          <a:p>
+            <a:r>
+              <a:rPr lang="en-US" dirty="0" smtClean="0"/>
+              <a:t>Form Example</a:t>
+            </a:r>
+            <a:endParaRPr lang="en-US" dirty="0"/>
+          </a:p>
+        </p:txBody>
+      </p:sp>
+      <p:sp>
+        <p:nvSpPr>
+          <p:cNvPr id="5" name="Rectangle 4"/>
+          <p:cNvSpPr/>
+          <p:nvPr/>
+        </p:nvSpPr>
+        <p:spPr>
+          <a:xfrm>
+            <a:off x="3735740" y="1589633"/>
+            <a:ext cx="1743958" cy="509048"/>
+          </a:xfrm>
+          <a:prstGeom prst="rect">
+            <a:avLst/>
+          </a:prstGeom>
+          <a:ln>
+            <a:noFill/>
+          </a:ln>
+        </p:spPr>
+        <p:style>
+          <a:lnRef idx="2">
+            <a:schemeClr val="accent1">
+              <a:shade val="50000"/>
+            </a:schemeClr>
+          </a:lnRef>
+          <a:fillRef idx="1">
+            <a:schemeClr val="accent1"/>
+          </a:fillRef>
+          <a:effectRef idx="0">
+            <a:schemeClr val="accent1"/>
+          </a:effectRef>
+          <a:fontRef idx="minor">
+            <a:schemeClr val="lt1"/>
+          </a:fontRef>
+        </p:style>
+        <p:txBody>
+          <a:bodyPr rtlCol="0" anchor="ctr"/>
+          <a:lstStyle/>
+          <a:p>
+            <a:pPr algn="ctr"/>
+            <a:r>
+              <a:rPr lang="en-US" noProof="1" smtClean="0"/>
+              <a:t>&lt;Form /&gt;</a:t>
+            </a:r>
+            <a:endParaRPr lang="en-US" noProof="1"/>
+          </a:p>
+        </p:txBody>
+      </p:sp>
+      <p:grpSp>
+        <p:nvGrpSpPr>
+          <p:cNvPr id="10" name="Group 9"/>
+          <p:cNvGrpSpPr/>
+          <p:nvPr/>
+        </p:nvGrpSpPr>
+        <p:grpSpPr>
+          <a:xfrm>
+            <a:off x="3735740" y="2357453"/>
+            <a:ext cx="1743958" cy="1174022"/>
+            <a:chOff x="1508289" y="2177590"/>
+            <a:chExt cx="1743958" cy="1174022"/>
+          </a:xfrm>
+        </p:grpSpPr>
+        <p:sp>
+          <p:nvSpPr>
+            <p:cNvPr id="7" name="Rectangle 6"/>
+            <p:cNvSpPr/>
+            <p:nvPr/>
+          </p:nvSpPr>
+          <p:spPr>
+            <a:xfrm>
+              <a:off x="1508289" y="2290711"/>
+              <a:ext cx="1743958" cy="1060901"/>
+            </a:xfrm>
+            <a:prstGeom prst="rect">
+              <a:avLst/>
+            </a:prstGeom>
+            <a:solidFill>
+              <a:schemeClr val="accent6">
+                <a:lumMod val="60000"/>
+                <a:lumOff val="40000"/>
+              </a:schemeClr>
+            </a:solidFill>
+            <a:ln>
+              <a:noFill/>
+            </a:ln>
+          </p:spPr>
+          <p:style>
+            <a:lnRef idx="2">
+              <a:schemeClr val="accent1">
+                <a:shade val="50000"/>
+              </a:schemeClr>
+            </a:lnRef>
+            <a:fillRef idx="1">
+              <a:schemeClr val="accent1"/>
+            </a:fillRef>
+            <a:effectRef idx="0">
+              <a:schemeClr val="accent1"/>
+            </a:effectRef>
+            <a:fontRef idx="minor">
+              <a:schemeClr val="lt1"/>
+            </a:fontRef>
+          </p:style>
+          <p:txBody>
+            <a:bodyPr vert="horz" lIns="90000" tIns="180000" rIns="90000" bIns="90000" rtlCol="0" anchor="t" anchorCtr="0"/>
+            <a:lstStyle/>
+            <a:p>
+              <a:pPr>
+                <a:lnSpc>
+                  <a:spcPts val="1800"/>
+                </a:lnSpc>
+              </a:pPr>
+              <a:r>
+                <a:rPr lang="sl-SI" dirty="0" smtClean="0"/>
+                <a:t>firstName: string</a:t>
+              </a:r>
+            </a:p>
+            <a:p>
+              <a:pPr>
+                <a:lnSpc>
+                  <a:spcPts val="1800"/>
+                </a:lnSpc>
+              </a:pPr>
+              <a:r>
+                <a:rPr lang="sl-SI" dirty="0" smtClean="0"/>
+                <a:t>email: string</a:t>
+              </a:r>
+            </a:p>
+            <a:p>
+              <a:pPr>
+                <a:lnSpc>
+                  <a:spcPts val="1800"/>
+                </a:lnSpc>
+              </a:pPr>
+              <a:r>
+                <a:rPr lang="sl-SI" dirty="0" smtClean="0"/>
+                <a:t>age: string</a:t>
+              </a:r>
+            </a:p>
+          </p:txBody>
+        </p:sp>
+        <p:sp>
+          <p:nvSpPr>
+            <p:cNvPr id="9" name="Rectangle 8"/>
+            <p:cNvSpPr/>
+            <p:nvPr/>
+          </p:nvSpPr>
+          <p:spPr>
+            <a:xfrm>
+              <a:off x="1508289" y="2177590"/>
+              <a:ext cx="904973" cy="226243"/>
+            </a:xfrm>
+            <a:prstGeom prst="rect">
+              <a:avLst/>
+            </a:prstGeom>
+            <a:solidFill>
+              <a:schemeClr val="accent6"/>
+            </a:solidFill>
+            <a:ln>
+              <a:noFill/>
+            </a:ln>
+          </p:spPr>
+          <p:style>
+            <a:lnRef idx="2">
+              <a:schemeClr val="accent1">
+                <a:shade val="50000"/>
+              </a:schemeClr>
+            </a:lnRef>
+            <a:fillRef idx="1">
+              <a:schemeClr val="accent1"/>
+            </a:fillRef>
+            <a:effectRef idx="0">
+              <a:schemeClr val="accent1"/>
+            </a:effectRef>
+            <a:fontRef idx="minor">
+              <a:schemeClr val="lt1"/>
+            </a:fontRef>
+          </p:style>
+          <p:txBody>
+            <a:bodyPr rtlCol="0" anchor="ctr"/>
+            <a:lstStyle/>
+            <a:p>
+              <a:pPr algn="ctr"/>
+              <a:r>
+                <a:rPr lang="sl-SI" sz="1200" dirty="0" smtClean="0"/>
+                <a:t>state</a:t>
+              </a:r>
+              <a:endParaRPr sz="1200" dirty="0"/>
+            </a:p>
+          </p:txBody>
+        </p:sp>
+      </p:grpSp>
+    </p:spTree>
+    <p:extLst>
+      <p:ext uri="{BB962C8B-B14F-4D97-AF65-F5344CB8AC3E}">
+        <p14:creationId xmlns:p14="http://schemas.microsoft.com/office/powerpoint/2010/main" val="2099270712"/>
+      </p:ext>
+    </p:extLst>
+  </p:cSld>
+  <p:clrMapOvr>
+    <a:masterClrMapping/>
+  </p:clrMapOvr>
+</p:sld>
+</file>
+
+<file path=ppt/slides/slide14.xml><?xml version="1.0" encoding="utf-8"?>
+<p:sld xmlns:a="http://schemas.openxmlformats.org/drawingml/2006/main" xmlns:r="http://schemas.openxmlformats.org/officeDocument/2006/relationships" xmlns:p="http://schemas.openxmlformats.org/presentationml/2006/main">
+  <p:cSld>
+    <p:spTree>
+      <p:nvGrpSpPr>
+        <p:cNvPr id="1" name=""/>
+        <p:cNvGrpSpPr/>
+        <p:nvPr/>
+      </p:nvGrpSpPr>
+      <p:grpSpPr>
+        <a:xfrm>
+          <a:off x="0" y="0"/>
+          <a:ext cx="0" cy="0"/>
+          <a:chOff x="0" y="0"/>
+          <a:chExt cx="0" cy="0"/>
+        </a:xfrm>
+      </p:grpSpPr>
+      <p:sp>
+        <p:nvSpPr>
+          <p:cNvPr id="2" name="Title 1"/>
+          <p:cNvSpPr>
+            <a:spLocks noGrp="1"/>
+          </p:cNvSpPr>
+          <p:nvPr>
+            <p:ph type="title"/>
+          </p:nvPr>
+        </p:nvSpPr>
+        <p:spPr/>
+        <p:txBody>
+          <a:bodyPr/>
+          <a:lstStyle/>
+          <a:p>
+            <a:r>
+              <a:rPr lang="en-US" dirty="0" smtClean="0"/>
+              <a:t>API Example</a:t>
+            </a:r>
+            <a:endParaRPr lang="en-US" dirty="0"/>
+          </a:p>
+        </p:txBody>
+      </p:sp>
+      <p:sp>
+        <p:nvSpPr>
+          <p:cNvPr id="5" name="Rectangle 4"/>
+          <p:cNvSpPr/>
+          <p:nvPr/>
+        </p:nvSpPr>
+        <p:spPr>
+          <a:xfrm>
+            <a:off x="3735740" y="1589633"/>
+            <a:ext cx="1743958" cy="509048"/>
+          </a:xfrm>
+          <a:prstGeom prst="rect">
+            <a:avLst/>
+          </a:prstGeom>
+          <a:ln>
+            <a:noFill/>
+          </a:ln>
+        </p:spPr>
+        <p:style>
+          <a:lnRef idx="2">
+            <a:schemeClr val="accent1">
+              <a:shade val="50000"/>
+            </a:schemeClr>
+          </a:lnRef>
+          <a:fillRef idx="1">
+            <a:schemeClr val="accent1"/>
+          </a:fillRef>
+          <a:effectRef idx="0">
+            <a:schemeClr val="accent1"/>
+          </a:effectRef>
+          <a:fontRef idx="minor">
+            <a:schemeClr val="lt1"/>
+          </a:fontRef>
+        </p:style>
+        <p:txBody>
+          <a:bodyPr rtlCol="0" anchor="ctr"/>
+          <a:lstStyle/>
+          <a:p>
+            <a:pPr algn="ctr"/>
+            <a:r>
+              <a:rPr lang="en-US" noProof="1" smtClean="0"/>
+              <a:t>&lt;PokeList /&gt;</a:t>
+            </a:r>
+            <a:endParaRPr lang="en-US" noProof="1"/>
+          </a:p>
+        </p:txBody>
+      </p:sp>
+      <p:grpSp>
+        <p:nvGrpSpPr>
+          <p:cNvPr id="10" name="Group 9"/>
+          <p:cNvGrpSpPr/>
+          <p:nvPr/>
+        </p:nvGrpSpPr>
+        <p:grpSpPr>
+          <a:xfrm>
+            <a:off x="4772597" y="2245111"/>
+            <a:ext cx="2700686" cy="677713"/>
+            <a:chOff x="1508288" y="2177590"/>
+            <a:chExt cx="2700686" cy="677713"/>
+          </a:xfrm>
+        </p:grpSpPr>
+        <p:sp>
+          <p:nvSpPr>
+            <p:cNvPr id="7" name="Rectangle 6"/>
+            <p:cNvSpPr/>
+            <p:nvPr/>
+          </p:nvSpPr>
+          <p:spPr>
+            <a:xfrm>
+              <a:off x="1508288" y="2290712"/>
+              <a:ext cx="2700686" cy="564591"/>
+            </a:xfrm>
+            <a:prstGeom prst="rect">
+              <a:avLst/>
+            </a:prstGeom>
+            <a:solidFill>
+              <a:schemeClr val="accent6">
+                <a:lumMod val="60000"/>
+                <a:lumOff val="40000"/>
+              </a:schemeClr>
+            </a:solidFill>
+            <a:ln>
+              <a:noFill/>
+            </a:ln>
+          </p:spPr>
+          <p:style>
+            <a:lnRef idx="2">
+              <a:schemeClr val="accent1">
+                <a:shade val="50000"/>
+              </a:schemeClr>
+            </a:lnRef>
+            <a:fillRef idx="1">
+              <a:schemeClr val="accent1"/>
+            </a:fillRef>
+            <a:effectRef idx="0">
+              <a:schemeClr val="accent1"/>
+            </a:effectRef>
+            <a:fontRef idx="minor">
+              <a:schemeClr val="lt1"/>
+            </a:fontRef>
+          </p:style>
+          <p:txBody>
+            <a:bodyPr vert="horz" lIns="90000" tIns="180000" rIns="90000" bIns="90000" rtlCol="0" anchor="t" anchorCtr="0"/>
+            <a:lstStyle/>
+            <a:p>
+              <a:pPr>
+                <a:lnSpc>
+                  <a:spcPts val="1800"/>
+                </a:lnSpc>
+              </a:pPr>
+              <a:r>
+                <a:rPr lang="sl-SI" dirty="0"/>
+                <a:t>pokemons: Array&lt;PokemonType</a:t>
+              </a:r>
+              <a:r>
+                <a:rPr lang="sl-SI" dirty="0" smtClean="0"/>
+                <a:t>&gt;</a:t>
+              </a:r>
+            </a:p>
+          </p:txBody>
+        </p:sp>
+        <p:sp>
+          <p:nvSpPr>
+            <p:cNvPr id="9" name="Rectangle 8"/>
+            <p:cNvSpPr/>
+            <p:nvPr/>
+          </p:nvSpPr>
+          <p:spPr>
+            <a:xfrm>
+              <a:off x="1508289" y="2177590"/>
+              <a:ext cx="904973" cy="226243"/>
+            </a:xfrm>
+            <a:prstGeom prst="rect">
+              <a:avLst/>
+            </a:prstGeom>
+            <a:solidFill>
+              <a:schemeClr val="accent6"/>
+            </a:solidFill>
+            <a:ln>
+              <a:noFill/>
+            </a:ln>
+          </p:spPr>
+          <p:style>
+            <a:lnRef idx="2">
+              <a:schemeClr val="accent1">
+                <a:shade val="50000"/>
+              </a:schemeClr>
+            </a:lnRef>
+            <a:fillRef idx="1">
+              <a:schemeClr val="accent1"/>
+            </a:fillRef>
+            <a:effectRef idx="0">
+              <a:schemeClr val="accent1"/>
+            </a:effectRef>
+            <a:fontRef idx="minor">
+              <a:schemeClr val="lt1"/>
+            </a:fontRef>
+          </p:style>
+          <p:txBody>
+            <a:bodyPr rtlCol="0" anchor="ctr"/>
+            <a:lstStyle/>
+            <a:p>
+              <a:pPr algn="ctr"/>
+              <a:r>
+                <a:rPr lang="sl-SI" sz="1200" dirty="0" smtClean="0"/>
+                <a:t>state</a:t>
+              </a:r>
+              <a:endParaRPr sz="1200" dirty="0"/>
+            </a:p>
+          </p:txBody>
+        </p:sp>
+      </p:grpSp>
+      <p:grpSp>
+        <p:nvGrpSpPr>
+          <p:cNvPr id="8" name="Group 7"/>
+          <p:cNvGrpSpPr/>
+          <p:nvPr/>
+        </p:nvGrpSpPr>
+        <p:grpSpPr>
+          <a:xfrm>
+            <a:off x="2345331" y="2233319"/>
+            <a:ext cx="2073715" cy="677713"/>
+            <a:chOff x="1508288" y="2177590"/>
+            <a:chExt cx="2073715" cy="677713"/>
+          </a:xfrm>
+        </p:grpSpPr>
+        <p:sp>
+          <p:nvSpPr>
+            <p:cNvPr id="11" name="Rectangle 10"/>
+            <p:cNvSpPr/>
+            <p:nvPr/>
+          </p:nvSpPr>
+          <p:spPr>
+            <a:xfrm>
+              <a:off x="1508288" y="2290712"/>
+              <a:ext cx="2073715" cy="564591"/>
+            </a:xfrm>
+            <a:prstGeom prst="rect">
+              <a:avLst/>
+            </a:prstGeom>
+            <a:solidFill>
+              <a:schemeClr val="accent2">
+                <a:lumMod val="60000"/>
+                <a:lumOff val="40000"/>
+              </a:schemeClr>
+            </a:solidFill>
+            <a:ln>
+              <a:noFill/>
+            </a:ln>
+          </p:spPr>
+          <p:style>
+            <a:lnRef idx="2">
+              <a:schemeClr val="accent1">
+                <a:shade val="50000"/>
+              </a:schemeClr>
+            </a:lnRef>
+            <a:fillRef idx="1">
+              <a:schemeClr val="accent1"/>
+            </a:fillRef>
+            <a:effectRef idx="0">
+              <a:schemeClr val="accent1"/>
+            </a:effectRef>
+            <a:fontRef idx="minor">
+              <a:schemeClr val="lt1"/>
+            </a:fontRef>
+          </p:style>
+          <p:txBody>
+            <a:bodyPr vert="horz" lIns="90000" tIns="180000" rIns="90000" bIns="90000" rtlCol="0" anchor="t" anchorCtr="0"/>
+            <a:lstStyle/>
+            <a:p>
+              <a:pPr>
+                <a:lnSpc>
+                  <a:spcPts val="1800"/>
+                </a:lnSpc>
+              </a:pPr>
+              <a:r>
+                <a:rPr lang="sl-SI" dirty="0" smtClean="0"/>
+                <a:t>pokemons: </a:t>
+              </a:r>
+              <a:r>
+                <a:rPr lang="sl-SI" smtClean="0"/>
+                <a:t>Array&lt;string&gt;</a:t>
+              </a:r>
+              <a:endParaRPr lang="sl-SI" dirty="0" smtClean="0"/>
+            </a:p>
+          </p:txBody>
+        </p:sp>
+        <p:sp>
+          <p:nvSpPr>
+            <p:cNvPr id="12" name="Rectangle 11"/>
+            <p:cNvSpPr/>
+            <p:nvPr/>
+          </p:nvSpPr>
+          <p:spPr>
+            <a:xfrm>
+              <a:off x="1508289" y="2177590"/>
+              <a:ext cx="904973" cy="226243"/>
+            </a:xfrm>
+            <a:prstGeom prst="rect">
+              <a:avLst/>
+            </a:prstGeom>
+            <a:solidFill>
+              <a:schemeClr val="accent2"/>
+            </a:solidFill>
+            <a:ln>
+              <a:noFill/>
+            </a:ln>
+          </p:spPr>
+          <p:style>
+            <a:lnRef idx="2">
+              <a:schemeClr val="accent1">
+                <a:shade val="50000"/>
+              </a:schemeClr>
+            </a:lnRef>
+            <a:fillRef idx="1">
+              <a:schemeClr val="accent1"/>
+            </a:fillRef>
+            <a:effectRef idx="0">
+              <a:schemeClr val="accent1"/>
+            </a:effectRef>
+            <a:fontRef idx="minor">
+              <a:schemeClr val="lt1"/>
+            </a:fontRef>
+          </p:style>
+          <p:txBody>
+            <a:bodyPr rtlCol="0" anchor="ctr"/>
+            <a:lstStyle/>
+            <a:p>
+              <a:pPr algn="ctr"/>
+              <a:r>
+                <a:rPr lang="sl-SI" sz="1200" dirty="0" smtClean="0"/>
+                <a:t>props</a:t>
+              </a:r>
+              <a:endParaRPr sz="1200" dirty="0"/>
+            </a:p>
+          </p:txBody>
+        </p:sp>
+      </p:grpSp>
+      <p:sp>
+        <p:nvSpPr>
+          <p:cNvPr id="13" name="Rectangle 12"/>
+          <p:cNvSpPr/>
+          <p:nvPr/>
+        </p:nvSpPr>
+        <p:spPr>
+          <a:xfrm>
+            <a:off x="977624" y="3568427"/>
+            <a:ext cx="1743958" cy="509048"/>
+          </a:xfrm>
+          <a:prstGeom prst="rect">
+            <a:avLst/>
+          </a:prstGeom>
+          <a:ln>
+            <a:noFill/>
+          </a:ln>
+        </p:spPr>
+        <p:style>
+          <a:lnRef idx="2">
+            <a:schemeClr val="accent1">
+              <a:shade val="50000"/>
+            </a:schemeClr>
+          </a:lnRef>
+          <a:fillRef idx="1">
+            <a:schemeClr val="accent1"/>
+          </a:fillRef>
+          <a:effectRef idx="0">
+            <a:schemeClr val="accent1"/>
+          </a:effectRef>
+          <a:fontRef idx="minor">
+            <a:schemeClr val="lt1"/>
+          </a:fontRef>
+        </p:style>
+        <p:txBody>
+          <a:bodyPr rtlCol="0" anchor="ctr"/>
+          <a:lstStyle/>
+          <a:p>
+            <a:pPr algn="ctr"/>
+            <a:r>
+              <a:rPr lang="en-US" noProof="1" smtClean="0"/>
+              <a:t>&lt;PokeDisplay /&gt;</a:t>
+            </a:r>
+            <a:endParaRPr lang="en-US" noProof="1"/>
+          </a:p>
+        </p:txBody>
+      </p:sp>
+      <p:grpSp>
+        <p:nvGrpSpPr>
+          <p:cNvPr id="14" name="Group 13"/>
+          <p:cNvGrpSpPr/>
+          <p:nvPr/>
+        </p:nvGrpSpPr>
+        <p:grpSpPr>
+          <a:xfrm>
+            <a:off x="977624" y="4221859"/>
+            <a:ext cx="2073715" cy="677713"/>
+            <a:chOff x="1508288" y="2177590"/>
+            <a:chExt cx="2073715" cy="677713"/>
+          </a:xfrm>
+        </p:grpSpPr>
+        <p:sp>
+          <p:nvSpPr>
+            <p:cNvPr id="15" name="Rectangle 14"/>
+            <p:cNvSpPr/>
+            <p:nvPr/>
+          </p:nvSpPr>
+          <p:spPr>
+            <a:xfrm>
+              <a:off x="1508288" y="2290712"/>
+              <a:ext cx="2073715" cy="564591"/>
+            </a:xfrm>
+            <a:prstGeom prst="rect">
+              <a:avLst/>
+            </a:prstGeom>
+            <a:solidFill>
+              <a:schemeClr val="accent2">
+                <a:lumMod val="60000"/>
+                <a:lumOff val="40000"/>
+              </a:schemeClr>
+            </a:solidFill>
+            <a:ln>
+              <a:noFill/>
+            </a:ln>
+          </p:spPr>
+          <p:style>
+            <a:lnRef idx="2">
+              <a:schemeClr val="accent1">
+                <a:shade val="50000"/>
+              </a:schemeClr>
+            </a:lnRef>
+            <a:fillRef idx="1">
+              <a:schemeClr val="accent1"/>
+            </a:fillRef>
+            <a:effectRef idx="0">
+              <a:schemeClr val="accent1"/>
+            </a:effectRef>
+            <a:fontRef idx="minor">
+              <a:schemeClr val="lt1"/>
+            </a:fontRef>
+          </p:style>
+          <p:txBody>
+            <a:bodyPr vert="horz" lIns="90000" tIns="180000" rIns="90000" bIns="90000" rtlCol="0" anchor="t" anchorCtr="0"/>
+            <a:lstStyle/>
+            <a:p>
+              <a:pPr>
+                <a:lnSpc>
+                  <a:spcPts val="1800"/>
+                </a:lnSpc>
+              </a:pPr>
+              <a:r>
+                <a:rPr lang="sl-SI" dirty="0" smtClean="0"/>
+                <a:t>pokemon: PokemonType</a:t>
+              </a:r>
+            </a:p>
+          </p:txBody>
+        </p:sp>
+        <p:sp>
+          <p:nvSpPr>
+            <p:cNvPr id="16" name="Rectangle 15"/>
+            <p:cNvSpPr/>
+            <p:nvPr/>
+          </p:nvSpPr>
+          <p:spPr>
+            <a:xfrm>
+              <a:off x="1508289" y="2177590"/>
+              <a:ext cx="904973" cy="226243"/>
+            </a:xfrm>
+            <a:prstGeom prst="rect">
+              <a:avLst/>
+            </a:prstGeom>
+            <a:solidFill>
+              <a:schemeClr val="accent2"/>
+            </a:solidFill>
+            <a:ln>
+              <a:noFill/>
+            </a:ln>
+          </p:spPr>
+          <p:style>
+            <a:lnRef idx="2">
+              <a:schemeClr val="accent1">
+                <a:shade val="50000"/>
+              </a:schemeClr>
+            </a:lnRef>
+            <a:fillRef idx="1">
+              <a:schemeClr val="accent1"/>
+            </a:fillRef>
+            <a:effectRef idx="0">
+              <a:schemeClr val="accent1"/>
+            </a:effectRef>
+            <a:fontRef idx="minor">
+              <a:schemeClr val="lt1"/>
+            </a:fontRef>
+          </p:style>
+          <p:txBody>
+            <a:bodyPr rtlCol="0" anchor="ctr"/>
+            <a:lstStyle/>
+            <a:p>
+              <a:pPr algn="ctr"/>
+              <a:r>
+                <a:rPr lang="sl-SI" sz="1200" dirty="0" smtClean="0"/>
+                <a:t>props</a:t>
+              </a:r>
+              <a:endParaRPr sz="1200" dirty="0"/>
+            </a:p>
+          </p:txBody>
+        </p:sp>
+      </p:grpSp>
+      <p:sp>
+        <p:nvSpPr>
+          <p:cNvPr id="17" name="Rectangle 16"/>
+          <p:cNvSpPr/>
+          <p:nvPr/>
+        </p:nvSpPr>
+        <p:spPr>
+          <a:xfrm>
+            <a:off x="3735740" y="3567119"/>
+            <a:ext cx="1743958" cy="509048"/>
+          </a:xfrm>
+          <a:prstGeom prst="rect">
+            <a:avLst/>
+          </a:prstGeom>
+          <a:ln>
+            <a:noFill/>
+          </a:ln>
+        </p:spPr>
+        <p:style>
+          <a:lnRef idx="2">
+            <a:schemeClr val="accent1">
+              <a:shade val="50000"/>
+            </a:schemeClr>
+          </a:lnRef>
+          <a:fillRef idx="1">
+            <a:schemeClr val="accent1"/>
+          </a:fillRef>
+          <a:effectRef idx="0">
+            <a:schemeClr val="accent1"/>
+          </a:effectRef>
+          <a:fontRef idx="minor">
+            <a:schemeClr val="lt1"/>
+          </a:fontRef>
+        </p:style>
+        <p:txBody>
+          <a:bodyPr rtlCol="0" anchor="ctr"/>
+          <a:lstStyle/>
+          <a:p>
+            <a:pPr algn="ctr"/>
+            <a:r>
+              <a:rPr lang="en-US" noProof="1" smtClean="0"/>
+              <a:t>&lt;PokeDisplay /&gt;</a:t>
+            </a:r>
+            <a:endParaRPr lang="en-US" noProof="1"/>
+          </a:p>
+        </p:txBody>
+      </p:sp>
+      <p:grpSp>
+        <p:nvGrpSpPr>
+          <p:cNvPr id="18" name="Group 17"/>
+          <p:cNvGrpSpPr/>
+          <p:nvPr/>
+        </p:nvGrpSpPr>
+        <p:grpSpPr>
+          <a:xfrm>
+            <a:off x="3735740" y="4210805"/>
+            <a:ext cx="2073715" cy="677713"/>
+            <a:chOff x="1508288" y="2177590"/>
+            <a:chExt cx="2073715" cy="677713"/>
+          </a:xfrm>
+        </p:grpSpPr>
+        <p:sp>
+          <p:nvSpPr>
+            <p:cNvPr id="19" name="Rectangle 18"/>
+            <p:cNvSpPr/>
+            <p:nvPr/>
+          </p:nvSpPr>
+          <p:spPr>
+            <a:xfrm>
+              <a:off x="1508288" y="2290712"/>
+              <a:ext cx="2073715" cy="564591"/>
+            </a:xfrm>
+            <a:prstGeom prst="rect">
+              <a:avLst/>
+            </a:prstGeom>
+            <a:solidFill>
+              <a:schemeClr val="accent2">
+                <a:lumMod val="60000"/>
+                <a:lumOff val="40000"/>
+              </a:schemeClr>
+            </a:solidFill>
+            <a:ln>
+              <a:noFill/>
+            </a:ln>
+          </p:spPr>
+          <p:style>
+            <a:lnRef idx="2">
+              <a:schemeClr val="accent1">
+                <a:shade val="50000"/>
+              </a:schemeClr>
+            </a:lnRef>
+            <a:fillRef idx="1">
+              <a:schemeClr val="accent1"/>
+            </a:fillRef>
+            <a:effectRef idx="0">
+              <a:schemeClr val="accent1"/>
+            </a:effectRef>
+            <a:fontRef idx="minor">
+              <a:schemeClr val="lt1"/>
+            </a:fontRef>
+          </p:style>
+          <p:txBody>
+            <a:bodyPr vert="horz" lIns="90000" tIns="180000" rIns="90000" bIns="90000" rtlCol="0" anchor="t" anchorCtr="0"/>
+            <a:lstStyle/>
+            <a:p>
+              <a:pPr>
+                <a:lnSpc>
+                  <a:spcPts val="1800"/>
+                </a:lnSpc>
+              </a:pPr>
+              <a:r>
+                <a:rPr lang="sl-SI" dirty="0" smtClean="0"/>
+                <a:t>pokemon: PokemonType</a:t>
+              </a:r>
+            </a:p>
+          </p:txBody>
+        </p:sp>
+        <p:sp>
+          <p:nvSpPr>
+            <p:cNvPr id="20" name="Rectangle 19"/>
+            <p:cNvSpPr/>
+            <p:nvPr/>
+          </p:nvSpPr>
+          <p:spPr>
+            <a:xfrm>
+              <a:off x="1508289" y="2177590"/>
+              <a:ext cx="904973" cy="226243"/>
+            </a:xfrm>
+            <a:prstGeom prst="rect">
+              <a:avLst/>
+            </a:prstGeom>
+            <a:solidFill>
+              <a:schemeClr val="accent2"/>
+            </a:solidFill>
+            <a:ln>
+              <a:noFill/>
+            </a:ln>
+          </p:spPr>
+          <p:style>
+            <a:lnRef idx="2">
+              <a:schemeClr val="accent1">
+                <a:shade val="50000"/>
+              </a:schemeClr>
+            </a:lnRef>
+            <a:fillRef idx="1">
+              <a:schemeClr val="accent1"/>
+            </a:fillRef>
+            <a:effectRef idx="0">
+              <a:schemeClr val="accent1"/>
+            </a:effectRef>
+            <a:fontRef idx="minor">
+              <a:schemeClr val="lt1"/>
+            </a:fontRef>
+          </p:style>
+          <p:txBody>
+            <a:bodyPr rtlCol="0" anchor="ctr"/>
+            <a:lstStyle/>
+            <a:p>
+              <a:pPr algn="ctr"/>
+              <a:r>
+                <a:rPr lang="sl-SI" sz="1200" dirty="0" smtClean="0"/>
+                <a:t>props</a:t>
+              </a:r>
+              <a:endParaRPr sz="1200" dirty="0"/>
+            </a:p>
+          </p:txBody>
+        </p:sp>
+      </p:grpSp>
+      <p:sp>
+        <p:nvSpPr>
+          <p:cNvPr id="21" name="Rectangle 20"/>
+          <p:cNvSpPr/>
+          <p:nvPr/>
+        </p:nvSpPr>
+        <p:spPr>
+          <a:xfrm>
+            <a:off x="6339273" y="3545602"/>
+            <a:ext cx="1743958" cy="509048"/>
+          </a:xfrm>
+          <a:prstGeom prst="rect">
+            <a:avLst/>
+          </a:prstGeom>
+          <a:ln>
+            <a:noFill/>
+          </a:ln>
+        </p:spPr>
+        <p:style>
+          <a:lnRef idx="2">
+            <a:schemeClr val="accent1">
+              <a:shade val="50000"/>
+            </a:schemeClr>
+          </a:lnRef>
+          <a:fillRef idx="1">
+            <a:schemeClr val="accent1"/>
+          </a:fillRef>
+          <a:effectRef idx="0">
+            <a:schemeClr val="accent1"/>
+          </a:effectRef>
+          <a:fontRef idx="minor">
+            <a:schemeClr val="lt1"/>
+          </a:fontRef>
+        </p:style>
+        <p:txBody>
+          <a:bodyPr rtlCol="0" anchor="ctr"/>
+          <a:lstStyle/>
+          <a:p>
+            <a:pPr algn="ctr"/>
+            <a:r>
+              <a:rPr lang="en-US" noProof="1" smtClean="0"/>
+              <a:t>&lt;PokeDisplay /&gt;</a:t>
+            </a:r>
+            <a:endParaRPr lang="en-US" noProof="1"/>
+          </a:p>
+        </p:txBody>
+      </p:sp>
+      <p:grpSp>
+        <p:nvGrpSpPr>
+          <p:cNvPr id="22" name="Group 21"/>
+          <p:cNvGrpSpPr/>
+          <p:nvPr/>
+        </p:nvGrpSpPr>
+        <p:grpSpPr>
+          <a:xfrm>
+            <a:off x="6339273" y="4199034"/>
+            <a:ext cx="2073715" cy="677713"/>
+            <a:chOff x="1508288" y="2177590"/>
+            <a:chExt cx="2073715" cy="677713"/>
+          </a:xfrm>
+        </p:grpSpPr>
+        <p:sp>
+          <p:nvSpPr>
+            <p:cNvPr id="23" name="Rectangle 22"/>
+            <p:cNvSpPr/>
+            <p:nvPr/>
+          </p:nvSpPr>
+          <p:spPr>
+            <a:xfrm>
+              <a:off x="1508288" y="2290712"/>
+              <a:ext cx="2073715" cy="564591"/>
+            </a:xfrm>
+            <a:prstGeom prst="rect">
+              <a:avLst/>
+            </a:prstGeom>
+            <a:solidFill>
+              <a:schemeClr val="accent2">
+                <a:lumMod val="60000"/>
+                <a:lumOff val="40000"/>
+              </a:schemeClr>
+            </a:solidFill>
+            <a:ln>
+              <a:noFill/>
+            </a:ln>
+          </p:spPr>
+          <p:style>
+            <a:lnRef idx="2">
+              <a:schemeClr val="accent1">
+                <a:shade val="50000"/>
+              </a:schemeClr>
+            </a:lnRef>
+            <a:fillRef idx="1">
+              <a:schemeClr val="accent1"/>
+            </a:fillRef>
+            <a:effectRef idx="0">
+              <a:schemeClr val="accent1"/>
+            </a:effectRef>
+            <a:fontRef idx="minor">
+              <a:schemeClr val="lt1"/>
+            </a:fontRef>
+          </p:style>
+          <p:txBody>
+            <a:bodyPr vert="horz" lIns="90000" tIns="180000" rIns="90000" bIns="90000" rtlCol="0" anchor="t" anchorCtr="0"/>
+            <a:lstStyle/>
+            <a:p>
+              <a:pPr>
+                <a:lnSpc>
+                  <a:spcPts val="1800"/>
+                </a:lnSpc>
+              </a:pPr>
+              <a:r>
+                <a:rPr lang="sl-SI" dirty="0" smtClean="0"/>
+                <a:t>pokemon: PokemonType</a:t>
+              </a:r>
+            </a:p>
+          </p:txBody>
+        </p:sp>
+        <p:sp>
+          <p:nvSpPr>
+            <p:cNvPr id="24" name="Rectangle 23"/>
+            <p:cNvSpPr/>
+            <p:nvPr/>
+          </p:nvSpPr>
+          <p:spPr>
+            <a:xfrm>
+              <a:off x="1508289" y="2177590"/>
+              <a:ext cx="904973" cy="226243"/>
+            </a:xfrm>
+            <a:prstGeom prst="rect">
+              <a:avLst/>
+            </a:prstGeom>
+            <a:solidFill>
+              <a:schemeClr val="accent2"/>
+            </a:solidFill>
+            <a:ln>
+              <a:noFill/>
+            </a:ln>
+          </p:spPr>
+          <p:style>
+            <a:lnRef idx="2">
+              <a:schemeClr val="accent1">
+                <a:shade val="50000"/>
+              </a:schemeClr>
+            </a:lnRef>
+            <a:fillRef idx="1">
+              <a:schemeClr val="accent1"/>
+            </a:fillRef>
+            <a:effectRef idx="0">
+              <a:schemeClr val="accent1"/>
+            </a:effectRef>
+            <a:fontRef idx="minor">
+              <a:schemeClr val="lt1"/>
+            </a:fontRef>
+          </p:style>
+          <p:txBody>
+            <a:bodyPr rtlCol="0" anchor="ctr"/>
+            <a:lstStyle/>
+            <a:p>
+              <a:pPr algn="ctr"/>
+              <a:r>
+                <a:rPr lang="sl-SI" sz="1200" dirty="0" smtClean="0"/>
+                <a:t>props</a:t>
+              </a:r>
+              <a:endParaRPr sz="1200" dirty="0"/>
+            </a:p>
+          </p:txBody>
+        </p:sp>
+      </p:grpSp>
+      <p:cxnSp>
+        <p:nvCxnSpPr>
+          <p:cNvPr id="26" name="Elbow Connector 25"/>
+          <p:cNvCxnSpPr>
+            <a:stCxn id="5" idx="1"/>
+            <a:endCxn id="13" idx="0"/>
+          </p:cNvCxnSpPr>
+          <p:nvPr/>
+        </p:nvCxnSpPr>
+        <p:spPr>
+          <a:xfrm rot="10800000" flipV="1">
+            <a:off x="1849604" y="1844157"/>
+            <a:ext cx="1886137" cy="1724270"/>
+          </a:xfrm>
+          <a:prstGeom prst="bentConnector2">
+            <a:avLst/>
+          </a:prstGeom>
+          <a:ln w="25400">
+            <a:solidFill>
+              <a:schemeClr val="bg1"/>
+            </a:solidFill>
+          </a:ln>
+        </p:spPr>
+        <p:style>
+          <a:lnRef idx="1">
+            <a:schemeClr val="accent1"/>
+          </a:lnRef>
+          <a:fillRef idx="0">
+            <a:schemeClr val="accent1"/>
+          </a:fillRef>
+          <a:effectRef idx="0">
+            <a:schemeClr val="accent1"/>
+          </a:effectRef>
+          <a:fontRef idx="minor">
+            <a:schemeClr val="tx1"/>
+          </a:fontRef>
+        </p:style>
+      </p:cxnSp>
+      <p:cxnSp>
+        <p:nvCxnSpPr>
+          <p:cNvPr id="31" name="Elbow Connector 30"/>
+          <p:cNvCxnSpPr>
+            <a:stCxn id="5" idx="3"/>
+            <a:endCxn id="21" idx="3"/>
+          </p:cNvCxnSpPr>
+          <p:nvPr/>
+        </p:nvCxnSpPr>
+        <p:spPr>
+          <a:xfrm>
+            <a:off x="5479698" y="1844157"/>
+            <a:ext cx="2603533" cy="1955969"/>
+          </a:xfrm>
+          <a:prstGeom prst="bentConnector3">
+            <a:avLst>
+              <a:gd name="adj1" fmla="val 108780"/>
+            </a:avLst>
+          </a:prstGeom>
+          <a:ln w="25400">
+            <a:solidFill>
+              <a:schemeClr val="bg1"/>
+            </a:solidFill>
+          </a:ln>
+        </p:spPr>
+        <p:style>
+          <a:lnRef idx="1">
+            <a:schemeClr val="accent1"/>
+          </a:lnRef>
+          <a:fillRef idx="0">
+            <a:schemeClr val="accent1"/>
+          </a:fillRef>
+          <a:effectRef idx="0">
+            <a:schemeClr val="accent1"/>
+          </a:effectRef>
+          <a:fontRef idx="minor">
+            <a:schemeClr val="tx1"/>
+          </a:fontRef>
+        </p:style>
+      </p:cxnSp>
+      <p:cxnSp>
+        <p:nvCxnSpPr>
+          <p:cNvPr id="36" name="Straight Connector 35"/>
+          <p:cNvCxnSpPr>
+            <a:stCxn id="5" idx="2"/>
+            <a:endCxn id="17" idx="0"/>
+          </p:cNvCxnSpPr>
+          <p:nvPr/>
+        </p:nvCxnSpPr>
+        <p:spPr>
+          <a:xfrm>
+            <a:off x="4607719" y="2098681"/>
+            <a:ext cx="0" cy="1468438"/>
+          </a:xfrm>
+          <a:prstGeom prst="line">
+            <a:avLst/>
+          </a:prstGeom>
+          <a:ln w="25400">
+            <a:solidFill>
+              <a:schemeClr val="bg1"/>
+            </a:solidFill>
+          </a:ln>
+        </p:spPr>
+        <p:style>
+          <a:lnRef idx="1">
+            <a:schemeClr val="accent1"/>
+          </a:lnRef>
+          <a:fillRef idx="0">
+            <a:schemeClr val="accent1"/>
+          </a:fillRef>
+          <a:effectRef idx="0">
+            <a:schemeClr val="accent1"/>
+          </a:effectRef>
+          <a:fontRef idx="minor">
+            <a:schemeClr val="tx1"/>
+          </a:fontRef>
+        </p:style>
+      </p:cxnSp>
+      <p:grpSp>
+        <p:nvGrpSpPr>
+          <p:cNvPr id="40" name="Group 39"/>
+          <p:cNvGrpSpPr/>
+          <p:nvPr/>
+        </p:nvGrpSpPr>
+        <p:grpSpPr>
+          <a:xfrm>
+            <a:off x="6697937" y="266797"/>
+            <a:ext cx="2073715" cy="1760727"/>
+            <a:chOff x="1508288" y="2177590"/>
+            <a:chExt cx="2073715" cy="1760727"/>
+          </a:xfrm>
+        </p:grpSpPr>
+        <p:sp>
+          <p:nvSpPr>
+            <p:cNvPr id="41" name="Rectangle 40"/>
+            <p:cNvSpPr/>
+            <p:nvPr/>
+          </p:nvSpPr>
+          <p:spPr>
+            <a:xfrm>
+              <a:off x="1508288" y="2290712"/>
+              <a:ext cx="2073715" cy="1647605"/>
+            </a:xfrm>
+            <a:prstGeom prst="rect">
+              <a:avLst/>
+            </a:prstGeom>
+            <a:solidFill>
+              <a:schemeClr val="accent4">
+                <a:lumMod val="60000"/>
+                <a:lumOff val="40000"/>
+              </a:schemeClr>
+            </a:solidFill>
+            <a:ln>
+              <a:noFill/>
+            </a:ln>
+          </p:spPr>
+          <p:style>
+            <a:lnRef idx="2">
+              <a:schemeClr val="accent1">
+                <a:shade val="50000"/>
+              </a:schemeClr>
+            </a:lnRef>
+            <a:fillRef idx="1">
+              <a:schemeClr val="accent1"/>
+            </a:fillRef>
+            <a:effectRef idx="0">
+              <a:schemeClr val="accent1"/>
+            </a:effectRef>
+            <a:fontRef idx="minor">
+              <a:schemeClr val="lt1"/>
+            </a:fontRef>
+          </p:style>
+          <p:txBody>
+            <a:bodyPr vert="horz" lIns="90000" tIns="180000" rIns="90000" bIns="90000" rtlCol="0" anchor="t" anchorCtr="0"/>
+            <a:lstStyle/>
+            <a:p>
+              <a:pPr>
+                <a:lnSpc>
+                  <a:spcPts val="1800"/>
+                </a:lnSpc>
+              </a:pPr>
+              <a:r>
+                <a:rPr lang="sl-SI" dirty="0" smtClean="0"/>
+                <a:t>PokemonType: {</a:t>
+              </a:r>
+            </a:p>
+            <a:p>
+              <a:pPr>
+                <a:lnSpc>
+                  <a:spcPts val="1800"/>
+                </a:lnSpc>
+              </a:pPr>
+              <a:r>
+                <a:rPr lang="sl-SI" dirty="0" smtClean="0"/>
+                <a:t>  name</a:t>
+              </a:r>
+              <a:r>
+                <a:rPr lang="sl-SI" dirty="0"/>
+                <a:t>: </a:t>
+              </a:r>
+              <a:r>
+                <a:rPr lang="sl-SI" dirty="0" smtClean="0"/>
+                <a:t>string</a:t>
+              </a:r>
+            </a:p>
+            <a:p>
+              <a:pPr>
+                <a:lnSpc>
+                  <a:spcPts val="1800"/>
+                </a:lnSpc>
+              </a:pPr>
+              <a:r>
+                <a:rPr lang="sl-SI" dirty="0" smtClean="0"/>
+                <a:t>  image</a:t>
+              </a:r>
+              <a:r>
+                <a:rPr lang="sl-SI" dirty="0"/>
+                <a:t>: </a:t>
+              </a:r>
+              <a:r>
+                <a:rPr lang="sl-SI" dirty="0" smtClean="0"/>
+                <a:t>string</a:t>
+              </a:r>
+            </a:p>
+            <a:p>
+              <a:pPr>
+                <a:lnSpc>
+                  <a:spcPts val="1800"/>
+                </a:lnSpc>
+              </a:pPr>
+              <a:r>
+                <a:rPr lang="sl-SI" dirty="0" smtClean="0"/>
+                <a:t>  weight</a:t>
+              </a:r>
+              <a:r>
+                <a:rPr lang="sl-SI" dirty="0"/>
+                <a:t>: </a:t>
+              </a:r>
+              <a:r>
+                <a:rPr lang="sl-SI" dirty="0" smtClean="0"/>
+                <a:t>number</a:t>
+              </a:r>
+            </a:p>
+            <a:p>
+              <a:pPr>
+                <a:lnSpc>
+                  <a:spcPts val="1800"/>
+                </a:lnSpc>
+              </a:pPr>
+              <a:r>
+                <a:rPr lang="sl-SI" dirty="0" smtClean="0"/>
+                <a:t>  xp</a:t>
+              </a:r>
+              <a:r>
+                <a:rPr lang="sl-SI" dirty="0"/>
+                <a:t>: </a:t>
+              </a:r>
+              <a:r>
+                <a:rPr lang="sl-SI" dirty="0" smtClean="0"/>
+                <a:t>number</a:t>
+              </a:r>
+            </a:p>
+            <a:p>
+              <a:pPr>
+                <a:lnSpc>
+                  <a:spcPts val="1800"/>
+                </a:lnSpc>
+              </a:pPr>
+              <a:r>
+                <a:rPr lang="sl-SI" dirty="0"/>
+                <a:t>}</a:t>
+              </a:r>
+              <a:endParaRPr lang="sl-SI" dirty="0" smtClean="0"/>
+            </a:p>
+          </p:txBody>
+        </p:sp>
+        <p:sp>
+          <p:nvSpPr>
+            <p:cNvPr id="42" name="Rectangle 41"/>
+            <p:cNvSpPr/>
+            <p:nvPr/>
+          </p:nvSpPr>
+          <p:spPr>
+            <a:xfrm>
+              <a:off x="1508289" y="2177590"/>
+              <a:ext cx="904973" cy="226243"/>
+            </a:xfrm>
+            <a:prstGeom prst="rect">
+              <a:avLst/>
+            </a:prstGeom>
+            <a:solidFill>
+              <a:schemeClr val="accent4"/>
+            </a:solidFill>
+            <a:ln>
+              <a:noFill/>
+            </a:ln>
+          </p:spPr>
+          <p:style>
+            <a:lnRef idx="2">
+              <a:schemeClr val="accent1">
+                <a:shade val="50000"/>
+              </a:schemeClr>
+            </a:lnRef>
+            <a:fillRef idx="1">
+              <a:schemeClr val="accent1"/>
+            </a:fillRef>
+            <a:effectRef idx="0">
+              <a:schemeClr val="accent1"/>
+            </a:effectRef>
+            <a:fontRef idx="minor">
+              <a:schemeClr val="lt1"/>
+            </a:fontRef>
+          </p:style>
+          <p:txBody>
+            <a:bodyPr rtlCol="0" anchor="ctr"/>
+            <a:lstStyle/>
+            <a:p>
+              <a:pPr algn="ctr"/>
+              <a:r>
+                <a:rPr lang="sl-SI" sz="1200" dirty="0" smtClean="0"/>
+                <a:t>types</a:t>
+              </a:r>
+              <a:endParaRPr sz="1200" dirty="0"/>
+            </a:p>
+          </p:txBody>
+        </p:sp>
+      </p:grpSp>
+    </p:spTree>
+    <p:extLst>
+      <p:ext uri="{BB962C8B-B14F-4D97-AF65-F5344CB8AC3E}">
+        <p14:creationId xmlns:p14="http://schemas.microsoft.com/office/powerpoint/2010/main" val="1450205426"/>
+      </p:ext>
+    </p:extLst>
+  </p:cSld>
+  <p:clrMapOvr>
+    <a:masterClrMapping/>
+  </p:clrMapOvr>
+</p:sld>
+</file>
+
+<file path=ppt/slides/slide15.xml><?xml version="1.0" encoding="utf-8"?>
+<p:sld xmlns:a="http://schemas.openxmlformats.org/drawingml/2006/main" xmlns:r="http://schemas.openxmlformats.org/officeDocument/2006/relationships" xmlns:p="http://schemas.openxmlformats.org/presentationml/2006/main">
+  <p:cSld>
+    <p:spTree>
+      <p:nvGrpSpPr>
+        <p:cNvPr id="1" name=""/>
+        <p:cNvGrpSpPr/>
+        <p:nvPr/>
+      </p:nvGrpSpPr>
+      <p:grpSpPr>
+        <a:xfrm>
+          <a:off x="0" y="0"/>
+          <a:ext cx="0" cy="0"/>
+          <a:chOff x="0" y="0"/>
+          <a:chExt cx="0" cy="0"/>
+        </a:xfrm>
+      </p:grpSpPr>
+      <p:sp>
+        <p:nvSpPr>
+          <p:cNvPr id="2" name="Title 1"/>
+          <p:cNvSpPr>
+            <a:spLocks noGrp="1"/>
+          </p:cNvSpPr>
+          <p:nvPr>
+            <p:ph type="title"/>
+          </p:nvPr>
+        </p:nvSpPr>
+        <p:spPr/>
+        <p:txBody>
+          <a:bodyPr/>
+          <a:lstStyle/>
+          <a:p>
+            <a:r>
+              <a:rPr lang="en-US" dirty="0" smtClean="0"/>
+              <a:t>React Router Example</a:t>
+            </a:r>
+            <a:endParaRPr lang="en-US" dirty="0"/>
+          </a:p>
+        </p:txBody>
+      </p:sp>
+      <p:sp>
+        <p:nvSpPr>
+          <p:cNvPr id="5" name="Rectangle 4"/>
+          <p:cNvSpPr/>
+          <p:nvPr/>
+        </p:nvSpPr>
+        <p:spPr>
+          <a:xfrm>
+            <a:off x="633562" y="1625258"/>
+            <a:ext cx="1743958" cy="509048"/>
+          </a:xfrm>
+          <a:prstGeom prst="rect">
+            <a:avLst/>
+          </a:prstGeom>
+          <a:ln>
+            <a:noFill/>
+          </a:ln>
+        </p:spPr>
+        <p:style>
+          <a:lnRef idx="2">
+            <a:schemeClr val="accent1">
+              <a:shade val="50000"/>
+            </a:schemeClr>
+          </a:lnRef>
+          <a:fillRef idx="1">
+            <a:schemeClr val="accent1"/>
+          </a:fillRef>
+          <a:effectRef idx="0">
+            <a:schemeClr val="accent1"/>
+          </a:effectRef>
+          <a:fontRef idx="minor">
+            <a:schemeClr val="lt1"/>
+          </a:fontRef>
+        </p:style>
+        <p:txBody>
+          <a:bodyPr rtlCol="0" anchor="ctr"/>
+          <a:lstStyle/>
+          <a:p>
+            <a:pPr algn="ctr"/>
+            <a:r>
+              <a:rPr lang="en-US" noProof="1" smtClean="0"/>
+              <a:t>&lt;Navbar /&gt;</a:t>
+            </a:r>
+            <a:endParaRPr lang="en-US" noProof="1"/>
+          </a:p>
+        </p:txBody>
+      </p:sp>
+      <p:sp>
+        <p:nvSpPr>
+          <p:cNvPr id="8" name="Rectangle 7"/>
+          <p:cNvSpPr/>
+          <p:nvPr/>
+        </p:nvSpPr>
+        <p:spPr>
+          <a:xfrm>
+            <a:off x="3042273" y="1632361"/>
+            <a:ext cx="1743958" cy="509048"/>
+          </a:xfrm>
+          <a:prstGeom prst="rect">
+            <a:avLst/>
+          </a:prstGeom>
+          <a:ln>
+            <a:noFill/>
+          </a:ln>
+        </p:spPr>
+        <p:style>
+          <a:lnRef idx="2">
+            <a:schemeClr val="accent1">
+              <a:shade val="50000"/>
+            </a:schemeClr>
+          </a:lnRef>
+          <a:fillRef idx="1">
+            <a:schemeClr val="accent1"/>
+          </a:fillRef>
+          <a:effectRef idx="0">
+            <a:schemeClr val="accent1"/>
+          </a:effectRef>
+          <a:fontRef idx="minor">
+            <a:schemeClr val="lt1"/>
+          </a:fontRef>
+        </p:style>
+        <p:txBody>
+          <a:bodyPr rtlCol="0" anchor="ctr"/>
+          <a:lstStyle/>
+          <a:p>
+            <a:pPr algn="ctr"/>
+            <a:r>
+              <a:rPr lang="en-US" noProof="1" smtClean="0"/>
+              <a:t>&lt;Route /&gt;</a:t>
+            </a:r>
+            <a:endParaRPr lang="en-US" noProof="1"/>
+          </a:p>
+        </p:txBody>
+      </p:sp>
+      <p:grpSp>
+        <p:nvGrpSpPr>
+          <p:cNvPr id="11" name="Group 10"/>
+          <p:cNvGrpSpPr/>
+          <p:nvPr/>
+        </p:nvGrpSpPr>
+        <p:grpSpPr>
+          <a:xfrm>
+            <a:off x="3042273" y="2370947"/>
+            <a:ext cx="2408500" cy="1163024"/>
+            <a:chOff x="1508288" y="2177590"/>
+            <a:chExt cx="2408500" cy="1163024"/>
+          </a:xfrm>
+        </p:grpSpPr>
+        <p:sp>
+          <p:nvSpPr>
+            <p:cNvPr id="12" name="Rectangle 11"/>
+            <p:cNvSpPr/>
+            <p:nvPr/>
+          </p:nvSpPr>
+          <p:spPr>
+            <a:xfrm>
+              <a:off x="1508288" y="2290712"/>
+              <a:ext cx="2408500" cy="1049902"/>
+            </a:xfrm>
+            <a:prstGeom prst="rect">
+              <a:avLst/>
+            </a:prstGeom>
+            <a:solidFill>
+              <a:schemeClr val="accent2">
+                <a:lumMod val="60000"/>
+                <a:lumOff val="40000"/>
+              </a:schemeClr>
+            </a:solidFill>
+            <a:ln>
+              <a:noFill/>
+            </a:ln>
+          </p:spPr>
+          <p:style>
+            <a:lnRef idx="2">
+              <a:schemeClr val="accent1">
+                <a:shade val="50000"/>
+              </a:schemeClr>
+            </a:lnRef>
+            <a:fillRef idx="1">
+              <a:schemeClr val="accent1"/>
+            </a:fillRef>
+            <a:effectRef idx="0">
+              <a:schemeClr val="accent1"/>
+            </a:effectRef>
+            <a:fontRef idx="minor">
+              <a:schemeClr val="lt1"/>
+            </a:fontRef>
+          </p:style>
+          <p:txBody>
+            <a:bodyPr vert="horz" lIns="90000" tIns="180000" rIns="90000" bIns="90000" rtlCol="0" anchor="t" anchorCtr="0"/>
+            <a:lstStyle/>
+            <a:p>
+              <a:pPr>
+                <a:lnSpc>
+                  <a:spcPts val="1800"/>
+                </a:lnSpc>
+              </a:pPr>
+              <a:r>
+                <a:rPr lang="sl-SI" dirty="0" smtClean="0"/>
+                <a:t>exact?: boolean</a:t>
+              </a:r>
+            </a:p>
+            <a:p>
+              <a:pPr>
+                <a:lnSpc>
+                  <a:spcPts val="1800"/>
+                </a:lnSpc>
+              </a:pPr>
+              <a:r>
+                <a:rPr lang="sl-SI" dirty="0" smtClean="0"/>
+                <a:t>path: string</a:t>
+              </a:r>
+            </a:p>
+            <a:p>
+              <a:pPr>
+                <a:lnSpc>
+                  <a:spcPts val="1800"/>
+                </a:lnSpc>
+              </a:pPr>
+              <a:r>
+                <a:rPr lang="sl-SI" dirty="0" smtClean="0"/>
+                <a:t>component: ReactComponent</a:t>
+              </a:r>
+            </a:p>
+          </p:txBody>
+        </p:sp>
+        <p:sp>
+          <p:nvSpPr>
+            <p:cNvPr id="13" name="Rectangle 12"/>
+            <p:cNvSpPr/>
+            <p:nvPr/>
+          </p:nvSpPr>
+          <p:spPr>
+            <a:xfrm>
+              <a:off x="1508289" y="2177590"/>
+              <a:ext cx="904973" cy="226243"/>
+            </a:xfrm>
+            <a:prstGeom prst="rect">
+              <a:avLst/>
+            </a:prstGeom>
+            <a:solidFill>
+              <a:schemeClr val="accent2"/>
+            </a:solidFill>
+            <a:ln>
+              <a:noFill/>
+            </a:ln>
+          </p:spPr>
+          <p:style>
+            <a:lnRef idx="2">
+              <a:schemeClr val="accent1">
+                <a:shade val="50000"/>
+              </a:schemeClr>
+            </a:lnRef>
+            <a:fillRef idx="1">
+              <a:schemeClr val="accent1"/>
+            </a:fillRef>
+            <a:effectRef idx="0">
+              <a:schemeClr val="accent1"/>
+            </a:effectRef>
+            <a:fontRef idx="minor">
+              <a:schemeClr val="lt1"/>
+            </a:fontRef>
+          </p:style>
+          <p:txBody>
+            <a:bodyPr rtlCol="0" anchor="ctr"/>
+            <a:lstStyle/>
+            <a:p>
+              <a:pPr algn="ctr"/>
+              <a:r>
+                <a:rPr lang="sl-SI" sz="1200" dirty="0" smtClean="0"/>
+                <a:t>props</a:t>
+              </a:r>
+              <a:endParaRPr sz="1200" dirty="0"/>
+            </a:p>
+          </p:txBody>
+        </p:sp>
+      </p:grpSp>
+      <p:sp>
+        <p:nvSpPr>
+          <p:cNvPr id="18" name="Rectangle 17"/>
+          <p:cNvSpPr/>
+          <p:nvPr/>
+        </p:nvSpPr>
+        <p:spPr>
+          <a:xfrm>
+            <a:off x="6022014" y="1625258"/>
+            <a:ext cx="1743958" cy="509048"/>
+          </a:xfrm>
+          <a:prstGeom prst="rect">
+            <a:avLst/>
+          </a:prstGeom>
+          <a:ln>
+            <a:noFill/>
+          </a:ln>
+        </p:spPr>
+        <p:style>
+          <a:lnRef idx="2">
+            <a:schemeClr val="accent1">
+              <a:shade val="50000"/>
+            </a:schemeClr>
+          </a:lnRef>
+          <a:fillRef idx="1">
+            <a:schemeClr val="accent1"/>
+          </a:fillRef>
+          <a:effectRef idx="0">
+            <a:schemeClr val="accent1"/>
+          </a:effectRef>
+          <a:fontRef idx="minor">
+            <a:schemeClr val="lt1"/>
+          </a:fontRef>
+        </p:style>
+        <p:txBody>
+          <a:bodyPr rtlCol="0" anchor="ctr"/>
+          <a:lstStyle/>
+          <a:p>
+            <a:pPr algn="ctr"/>
+            <a:r>
+              <a:rPr lang="en-US" noProof="1" smtClean="0"/>
+              <a:t>&lt;Route /&gt;</a:t>
+            </a:r>
+            <a:endParaRPr lang="en-US" noProof="1"/>
+          </a:p>
+        </p:txBody>
+      </p:sp>
+      <p:grpSp>
+        <p:nvGrpSpPr>
+          <p:cNvPr id="19" name="Group 18"/>
+          <p:cNvGrpSpPr/>
+          <p:nvPr/>
+        </p:nvGrpSpPr>
+        <p:grpSpPr>
+          <a:xfrm>
+            <a:off x="6022014" y="2370947"/>
+            <a:ext cx="2408500" cy="894766"/>
+            <a:chOff x="1508288" y="2177590"/>
+            <a:chExt cx="2408500" cy="894766"/>
+          </a:xfrm>
+        </p:grpSpPr>
+        <p:sp>
+          <p:nvSpPr>
+            <p:cNvPr id="20" name="Rectangle 19"/>
+            <p:cNvSpPr/>
+            <p:nvPr/>
+          </p:nvSpPr>
+          <p:spPr>
+            <a:xfrm>
+              <a:off x="1508288" y="2290712"/>
+              <a:ext cx="2408500" cy="781644"/>
+            </a:xfrm>
+            <a:prstGeom prst="rect">
+              <a:avLst/>
+            </a:prstGeom>
+            <a:solidFill>
+              <a:schemeClr val="accent2">
+                <a:lumMod val="60000"/>
+                <a:lumOff val="40000"/>
+              </a:schemeClr>
+            </a:solidFill>
+            <a:ln>
+              <a:noFill/>
+            </a:ln>
+          </p:spPr>
+          <p:style>
+            <a:lnRef idx="2">
+              <a:schemeClr val="accent1">
+                <a:shade val="50000"/>
+              </a:schemeClr>
+            </a:lnRef>
+            <a:fillRef idx="1">
+              <a:schemeClr val="accent1"/>
+            </a:fillRef>
+            <a:effectRef idx="0">
+              <a:schemeClr val="accent1"/>
+            </a:effectRef>
+            <a:fontRef idx="minor">
+              <a:schemeClr val="lt1"/>
+            </a:fontRef>
+          </p:style>
+          <p:txBody>
+            <a:bodyPr vert="horz" lIns="90000" tIns="180000" rIns="90000" bIns="90000" rtlCol="0" anchor="t" anchorCtr="0"/>
+            <a:lstStyle/>
+            <a:p>
+              <a:pPr>
+                <a:lnSpc>
+                  <a:spcPts val="1800"/>
+                </a:lnSpc>
+              </a:pPr>
+              <a:r>
+                <a:rPr lang="sl-SI" dirty="0" smtClean="0"/>
+                <a:t>path: string</a:t>
+              </a:r>
+            </a:p>
+            <a:p>
+              <a:pPr>
+                <a:lnSpc>
+                  <a:spcPts val="1800"/>
+                </a:lnSpc>
+              </a:pPr>
+              <a:r>
+                <a:rPr lang="sl-SI" dirty="0" smtClean="0"/>
+                <a:t>component: ReactComponent</a:t>
+              </a:r>
+            </a:p>
+          </p:txBody>
+        </p:sp>
+        <p:sp>
+          <p:nvSpPr>
+            <p:cNvPr id="21" name="Rectangle 20"/>
+            <p:cNvSpPr/>
+            <p:nvPr/>
+          </p:nvSpPr>
+          <p:spPr>
+            <a:xfrm>
+              <a:off x="1508289" y="2177590"/>
+              <a:ext cx="904973" cy="226243"/>
+            </a:xfrm>
+            <a:prstGeom prst="rect">
+              <a:avLst/>
+            </a:prstGeom>
+            <a:solidFill>
+              <a:schemeClr val="accent2"/>
+            </a:solidFill>
+            <a:ln>
+              <a:noFill/>
+            </a:ln>
+          </p:spPr>
+          <p:style>
+            <a:lnRef idx="2">
+              <a:schemeClr val="accent1">
+                <a:shade val="50000"/>
+              </a:schemeClr>
+            </a:lnRef>
+            <a:fillRef idx="1">
+              <a:schemeClr val="accent1"/>
+            </a:fillRef>
+            <a:effectRef idx="0">
+              <a:schemeClr val="accent1"/>
+            </a:effectRef>
+            <a:fontRef idx="minor">
+              <a:schemeClr val="lt1"/>
+            </a:fontRef>
+          </p:style>
+          <p:txBody>
+            <a:bodyPr rtlCol="0" anchor="ctr"/>
+            <a:lstStyle/>
+            <a:p>
+              <a:pPr algn="ctr"/>
+              <a:r>
+                <a:rPr lang="sl-SI" sz="1200" dirty="0" smtClean="0"/>
+                <a:t>props</a:t>
+              </a:r>
+              <a:endParaRPr sz="1200" dirty="0"/>
+            </a:p>
+          </p:txBody>
+        </p:sp>
+      </p:grpSp>
+    </p:spTree>
+    <p:extLst>
+      <p:ext uri="{BB962C8B-B14F-4D97-AF65-F5344CB8AC3E}">
+        <p14:creationId xmlns:p14="http://schemas.microsoft.com/office/powerpoint/2010/main" val="297615898"/>
+      </p:ext>
+    </p:extLst>
+  </p:cSld>
+  <p:clrMapOvr>
+    <a:masterClrMapping/>
+  </p:clrMapOvr>
+</p:sld>
+</file>
+
+<file path=ppt/slides/slide16.xml><?xml version="1.0" encoding="utf-8"?>
+<p:sld xmlns:a="http://schemas.openxmlformats.org/drawingml/2006/main" xmlns:r="http://schemas.openxmlformats.org/officeDocument/2006/relationships" xmlns:p="http://schemas.openxmlformats.org/presentationml/2006/main">
+  <p:cSld>
+    <p:spTree>
+      <p:nvGrpSpPr>
+        <p:cNvPr id="1" name=""/>
+        <p:cNvGrpSpPr/>
+        <p:nvPr/>
+      </p:nvGrpSpPr>
+      <p:grpSpPr>
+        <a:xfrm>
+          <a:off x="0" y="0"/>
+          <a:ext cx="0" cy="0"/>
+          <a:chOff x="0" y="0"/>
+          <a:chExt cx="0" cy="0"/>
+        </a:xfrm>
+      </p:grpSpPr>
+      <p:sp>
+        <p:nvSpPr>
+          <p:cNvPr id="2" name="Title 1"/>
+          <p:cNvSpPr>
+            <a:spLocks noGrp="1"/>
+          </p:cNvSpPr>
+          <p:nvPr>
+            <p:ph type="title"/>
+          </p:nvPr>
+        </p:nvSpPr>
+        <p:spPr/>
+        <p:txBody>
+          <a:bodyPr/>
+          <a:lstStyle/>
+          <a:p>
+            <a:r>
+              <a:rPr lang="en-US" dirty="0" smtClean="0"/>
+              <a:t>React Router Example</a:t>
+            </a:r>
+            <a:endParaRPr lang="en-US" dirty="0"/>
+          </a:p>
+        </p:txBody>
+      </p:sp>
+      <p:sp>
+        <p:nvSpPr>
+          <p:cNvPr id="5" name="Rectangle 4"/>
+          <p:cNvSpPr/>
+          <p:nvPr/>
+        </p:nvSpPr>
+        <p:spPr>
+          <a:xfrm>
+            <a:off x="633562" y="1625258"/>
+            <a:ext cx="1743958" cy="509048"/>
+          </a:xfrm>
+          <a:prstGeom prst="rect">
+            <a:avLst/>
+          </a:prstGeom>
+          <a:ln>
+            <a:noFill/>
+          </a:ln>
+        </p:spPr>
+        <p:style>
+          <a:lnRef idx="2">
+            <a:schemeClr val="accent1">
+              <a:shade val="50000"/>
+            </a:schemeClr>
+          </a:lnRef>
+          <a:fillRef idx="1">
+            <a:schemeClr val="accent1"/>
+          </a:fillRef>
+          <a:effectRef idx="0">
+            <a:schemeClr val="accent1"/>
+          </a:effectRef>
+          <a:fontRef idx="minor">
+            <a:schemeClr val="lt1"/>
+          </a:fontRef>
+        </p:style>
+        <p:txBody>
+          <a:bodyPr rtlCol="0" anchor="ctr"/>
+          <a:lstStyle/>
+          <a:p>
+            <a:pPr algn="ctr"/>
+            <a:r>
+              <a:rPr lang="en-US" noProof="1" smtClean="0"/>
+              <a:t>&lt;Navbar /&gt;</a:t>
+            </a:r>
+            <a:endParaRPr lang="en-US" noProof="1"/>
+          </a:p>
+        </p:txBody>
+      </p:sp>
+      <p:sp>
+        <p:nvSpPr>
+          <p:cNvPr id="8" name="Rectangle 7"/>
+          <p:cNvSpPr/>
+          <p:nvPr/>
+        </p:nvSpPr>
+        <p:spPr>
+          <a:xfrm>
+            <a:off x="3042273" y="1632361"/>
+            <a:ext cx="1743958" cy="509048"/>
+          </a:xfrm>
+          <a:prstGeom prst="rect">
+            <a:avLst/>
+          </a:prstGeom>
+          <a:ln>
+            <a:noFill/>
+          </a:ln>
+        </p:spPr>
+        <p:style>
+          <a:lnRef idx="2">
+            <a:schemeClr val="accent1">
+              <a:shade val="50000"/>
+            </a:schemeClr>
+          </a:lnRef>
+          <a:fillRef idx="1">
+            <a:schemeClr val="accent1"/>
+          </a:fillRef>
+          <a:effectRef idx="0">
+            <a:schemeClr val="accent1"/>
+          </a:effectRef>
+          <a:fontRef idx="minor">
+            <a:schemeClr val="lt1"/>
+          </a:fontRef>
+        </p:style>
+        <p:txBody>
+          <a:bodyPr rtlCol="0" anchor="ctr"/>
+          <a:lstStyle/>
+          <a:p>
+            <a:pPr algn="ctr"/>
+            <a:r>
+              <a:rPr lang="en-US" noProof="1" smtClean="0"/>
+              <a:t>&lt;Route /&gt;</a:t>
+            </a:r>
+            <a:endParaRPr lang="en-US" noProof="1"/>
+          </a:p>
+        </p:txBody>
+      </p:sp>
+      <p:grpSp>
+        <p:nvGrpSpPr>
+          <p:cNvPr id="11" name="Group 10"/>
+          <p:cNvGrpSpPr/>
+          <p:nvPr/>
+        </p:nvGrpSpPr>
+        <p:grpSpPr>
+          <a:xfrm>
+            <a:off x="3042273" y="2370947"/>
+            <a:ext cx="2408500" cy="1163024"/>
+            <a:chOff x="1508288" y="2177590"/>
+            <a:chExt cx="2408500" cy="1163024"/>
+          </a:xfrm>
+        </p:grpSpPr>
+        <p:sp>
+          <p:nvSpPr>
+            <p:cNvPr id="12" name="Rectangle 11"/>
+            <p:cNvSpPr/>
+            <p:nvPr/>
+          </p:nvSpPr>
+          <p:spPr>
+            <a:xfrm>
+              <a:off x="1508288" y="2290712"/>
+              <a:ext cx="2408500" cy="1049902"/>
+            </a:xfrm>
+            <a:prstGeom prst="rect">
+              <a:avLst/>
+            </a:prstGeom>
+            <a:solidFill>
+              <a:schemeClr val="accent2">
+                <a:lumMod val="60000"/>
+                <a:lumOff val="40000"/>
+              </a:schemeClr>
+            </a:solidFill>
+            <a:ln>
+              <a:noFill/>
+            </a:ln>
+          </p:spPr>
+          <p:style>
+            <a:lnRef idx="2">
+              <a:schemeClr val="accent1">
+                <a:shade val="50000"/>
+              </a:schemeClr>
+            </a:lnRef>
+            <a:fillRef idx="1">
+              <a:schemeClr val="accent1"/>
+            </a:fillRef>
+            <a:effectRef idx="0">
+              <a:schemeClr val="accent1"/>
+            </a:effectRef>
+            <a:fontRef idx="minor">
+              <a:schemeClr val="lt1"/>
+            </a:fontRef>
+          </p:style>
+          <p:txBody>
+            <a:bodyPr vert="horz" lIns="90000" tIns="180000" rIns="90000" bIns="90000" rtlCol="0" anchor="t" anchorCtr="0"/>
+            <a:lstStyle/>
+            <a:p>
+              <a:pPr>
+                <a:lnSpc>
+                  <a:spcPts val="1800"/>
+                </a:lnSpc>
+              </a:pPr>
+              <a:r>
+                <a:rPr lang="sl-SI" dirty="0" smtClean="0"/>
+                <a:t>exact?: boolean</a:t>
+              </a:r>
+            </a:p>
+            <a:p>
+              <a:pPr>
+                <a:lnSpc>
+                  <a:spcPts val="1800"/>
+                </a:lnSpc>
+              </a:pPr>
+              <a:r>
+                <a:rPr lang="sl-SI" dirty="0" smtClean="0"/>
+                <a:t>path: string</a:t>
+              </a:r>
+            </a:p>
+            <a:p>
+              <a:pPr>
+                <a:lnSpc>
+                  <a:spcPts val="1800"/>
+                </a:lnSpc>
+              </a:pPr>
+              <a:r>
+                <a:rPr lang="sl-SI" dirty="0" smtClean="0"/>
+                <a:t>component: ReactComponent</a:t>
+              </a:r>
+            </a:p>
+          </p:txBody>
+        </p:sp>
+        <p:sp>
+          <p:nvSpPr>
+            <p:cNvPr id="13" name="Rectangle 12"/>
+            <p:cNvSpPr/>
+            <p:nvPr/>
+          </p:nvSpPr>
+          <p:spPr>
+            <a:xfrm>
+              <a:off x="1508289" y="2177590"/>
+              <a:ext cx="904973" cy="226243"/>
+            </a:xfrm>
+            <a:prstGeom prst="rect">
+              <a:avLst/>
+            </a:prstGeom>
+            <a:solidFill>
+              <a:schemeClr val="accent2"/>
+            </a:solidFill>
+            <a:ln>
+              <a:noFill/>
+            </a:ln>
+          </p:spPr>
+          <p:style>
+            <a:lnRef idx="2">
+              <a:schemeClr val="accent1">
+                <a:shade val="50000"/>
+              </a:schemeClr>
+            </a:lnRef>
+            <a:fillRef idx="1">
+              <a:schemeClr val="accent1"/>
+            </a:fillRef>
+            <a:effectRef idx="0">
+              <a:schemeClr val="accent1"/>
+            </a:effectRef>
+            <a:fontRef idx="minor">
+              <a:schemeClr val="lt1"/>
+            </a:fontRef>
+          </p:style>
+          <p:txBody>
+            <a:bodyPr rtlCol="0" anchor="ctr"/>
+            <a:lstStyle/>
+            <a:p>
+              <a:pPr algn="ctr"/>
+              <a:r>
+                <a:rPr lang="sl-SI" sz="1200" dirty="0" smtClean="0"/>
+                <a:t>props</a:t>
+              </a:r>
+              <a:endParaRPr sz="1200" dirty="0"/>
+            </a:p>
+          </p:txBody>
+        </p:sp>
+      </p:grpSp>
+      <p:sp>
+        <p:nvSpPr>
+          <p:cNvPr id="18" name="Rectangle 17"/>
+          <p:cNvSpPr/>
+          <p:nvPr/>
+        </p:nvSpPr>
+        <p:spPr>
+          <a:xfrm>
+            <a:off x="6022014" y="1625258"/>
+            <a:ext cx="1743958" cy="509048"/>
+          </a:xfrm>
+          <a:prstGeom prst="rect">
+            <a:avLst/>
+          </a:prstGeom>
+          <a:ln>
+            <a:noFill/>
+          </a:ln>
+        </p:spPr>
+        <p:style>
+          <a:lnRef idx="2">
+            <a:schemeClr val="accent1">
+              <a:shade val="50000"/>
+            </a:schemeClr>
+          </a:lnRef>
+          <a:fillRef idx="1">
+            <a:schemeClr val="accent1"/>
+          </a:fillRef>
+          <a:effectRef idx="0">
+            <a:schemeClr val="accent1"/>
+          </a:effectRef>
+          <a:fontRef idx="minor">
+            <a:schemeClr val="lt1"/>
+          </a:fontRef>
+        </p:style>
+        <p:txBody>
+          <a:bodyPr rtlCol="0" anchor="ctr"/>
+          <a:lstStyle/>
+          <a:p>
+            <a:pPr algn="ctr"/>
+            <a:r>
+              <a:rPr lang="en-US" noProof="1" smtClean="0"/>
+              <a:t>&lt;Route /&gt;</a:t>
+            </a:r>
+            <a:endParaRPr lang="en-US" noProof="1"/>
+          </a:p>
+        </p:txBody>
+      </p:sp>
+      <p:grpSp>
+        <p:nvGrpSpPr>
+          <p:cNvPr id="19" name="Group 18"/>
+          <p:cNvGrpSpPr/>
+          <p:nvPr/>
+        </p:nvGrpSpPr>
+        <p:grpSpPr>
+          <a:xfrm>
+            <a:off x="6022014" y="2370947"/>
+            <a:ext cx="2408500" cy="894766"/>
+            <a:chOff x="1508288" y="2177590"/>
+            <a:chExt cx="2408500" cy="894766"/>
+          </a:xfrm>
+        </p:grpSpPr>
+        <p:sp>
+          <p:nvSpPr>
+            <p:cNvPr id="20" name="Rectangle 19"/>
+            <p:cNvSpPr/>
+            <p:nvPr/>
+          </p:nvSpPr>
+          <p:spPr>
+            <a:xfrm>
+              <a:off x="1508288" y="2290712"/>
+              <a:ext cx="2408500" cy="781644"/>
+            </a:xfrm>
+            <a:prstGeom prst="rect">
+              <a:avLst/>
+            </a:prstGeom>
+            <a:solidFill>
+              <a:schemeClr val="accent2">
+                <a:lumMod val="60000"/>
+                <a:lumOff val="40000"/>
+              </a:schemeClr>
+            </a:solidFill>
+            <a:ln>
+              <a:noFill/>
+            </a:ln>
+          </p:spPr>
+          <p:style>
+            <a:lnRef idx="2">
+              <a:schemeClr val="accent1">
+                <a:shade val="50000"/>
+              </a:schemeClr>
+            </a:lnRef>
+            <a:fillRef idx="1">
+              <a:schemeClr val="accent1"/>
+            </a:fillRef>
+            <a:effectRef idx="0">
+              <a:schemeClr val="accent1"/>
+            </a:effectRef>
+            <a:fontRef idx="minor">
+              <a:schemeClr val="lt1"/>
+            </a:fontRef>
+          </p:style>
+          <p:txBody>
+            <a:bodyPr vert="horz" lIns="90000" tIns="180000" rIns="90000" bIns="90000" rtlCol="0" anchor="t" anchorCtr="0"/>
+            <a:lstStyle/>
+            <a:p>
+              <a:pPr>
+                <a:lnSpc>
+                  <a:spcPts val="1800"/>
+                </a:lnSpc>
+              </a:pPr>
+              <a:r>
+                <a:rPr lang="sl-SI" dirty="0" smtClean="0"/>
+                <a:t>path: string</a:t>
+              </a:r>
+            </a:p>
+            <a:p>
+              <a:pPr>
+                <a:lnSpc>
+                  <a:spcPts val="1800"/>
+                </a:lnSpc>
+              </a:pPr>
+              <a:r>
+                <a:rPr lang="sl-SI" dirty="0" smtClean="0"/>
+                <a:t>component: ReactComponent</a:t>
+              </a:r>
+            </a:p>
+          </p:txBody>
+        </p:sp>
+        <p:sp>
+          <p:nvSpPr>
+            <p:cNvPr id="21" name="Rectangle 20"/>
+            <p:cNvSpPr/>
+            <p:nvPr/>
+          </p:nvSpPr>
+          <p:spPr>
+            <a:xfrm>
+              <a:off x="1508289" y="2177590"/>
+              <a:ext cx="904973" cy="226243"/>
+            </a:xfrm>
+            <a:prstGeom prst="rect">
+              <a:avLst/>
+            </a:prstGeom>
+            <a:solidFill>
+              <a:schemeClr val="accent2"/>
+            </a:solidFill>
+            <a:ln>
+              <a:noFill/>
+            </a:ln>
+          </p:spPr>
+          <p:style>
+            <a:lnRef idx="2">
+              <a:schemeClr val="accent1">
+                <a:shade val="50000"/>
+              </a:schemeClr>
+            </a:lnRef>
+            <a:fillRef idx="1">
+              <a:schemeClr val="accent1"/>
+            </a:fillRef>
+            <a:effectRef idx="0">
+              <a:schemeClr val="accent1"/>
+            </a:effectRef>
+            <a:fontRef idx="minor">
+              <a:schemeClr val="lt1"/>
+            </a:fontRef>
+          </p:style>
+          <p:txBody>
+            <a:bodyPr rtlCol="0" anchor="ctr"/>
+            <a:lstStyle/>
+            <a:p>
+              <a:pPr algn="ctr"/>
+              <a:r>
+                <a:rPr lang="sl-SI" sz="1200" dirty="0" smtClean="0"/>
+                <a:t>props</a:t>
+              </a:r>
+              <a:endParaRPr sz="1200" dirty="0"/>
+            </a:p>
+          </p:txBody>
+        </p:sp>
+      </p:grpSp>
+    </p:spTree>
+    <p:extLst>
+      <p:ext uri="{BB962C8B-B14F-4D97-AF65-F5344CB8AC3E}">
+        <p14:creationId xmlns:p14="http://schemas.microsoft.com/office/powerpoint/2010/main" val="1621729995"/>
+      </p:ext>
+    </p:extLst>
+  </p:cSld>
+  <p:clrMapOvr>
+    <a:masterClrMapping/>
+  </p:clrMapOvr>
 </p:sld>
 </file>
 

</xml_diff>

<commit_message>
Add some things to pptx
</commit_message>
<xml_diff>
--- a/Let's React - Workshop.pptx
+++ b/Let's React - Workshop.pptx
@@ -10,20 +10,20 @@
   <p:sldIdLst>
     <p:sldId id="256" r:id="rId2"/>
     <p:sldId id="258" r:id="rId3"/>
-    <p:sldId id="257" r:id="rId4"/>
-    <p:sldId id="259" r:id="rId5"/>
-    <p:sldId id="260" r:id="rId6"/>
-    <p:sldId id="261" r:id="rId7"/>
-    <p:sldId id="262" r:id="rId8"/>
-    <p:sldId id="263" r:id="rId9"/>
-    <p:sldId id="264" r:id="rId10"/>
-    <p:sldId id="265" r:id="rId11"/>
-    <p:sldId id="266" r:id="rId12"/>
-    <p:sldId id="268" r:id="rId13"/>
-    <p:sldId id="269" r:id="rId14"/>
-    <p:sldId id="270" r:id="rId15"/>
-    <p:sldId id="271" r:id="rId16"/>
-    <p:sldId id="272" r:id="rId17"/>
+    <p:sldId id="272" r:id="rId4"/>
+    <p:sldId id="257" r:id="rId5"/>
+    <p:sldId id="259" r:id="rId6"/>
+    <p:sldId id="260" r:id="rId7"/>
+    <p:sldId id="261" r:id="rId8"/>
+    <p:sldId id="262" r:id="rId9"/>
+    <p:sldId id="263" r:id="rId10"/>
+    <p:sldId id="264" r:id="rId11"/>
+    <p:sldId id="265" r:id="rId12"/>
+    <p:sldId id="266" r:id="rId13"/>
+    <p:sldId id="268" r:id="rId14"/>
+    <p:sldId id="269" r:id="rId15"/>
+    <p:sldId id="270" r:id="rId16"/>
+    <p:sldId id="271" r:id="rId17"/>
   </p:sldIdLst>
   <p:sldSz cx="9215438" cy="5759450"/>
   <p:notesSz cx="6858000" cy="9144000"/>
@@ -212,7 +212,7 @@
           <a:p>
             <a:fld id="{5607E995-E625-1845-A9C2-A4586FF7C56A}" type="datetimeFigureOut">
               <a:rPr lang="en-US" smtClean="0"/>
-              <a:t>2/15/17</a:t>
+              <a:t>3/1/17</a:t>
             </a:fld>
             <a:endParaRPr lang="en-US"/>
           </a:p>
@@ -722,7 +722,7 @@
     </p:spTree>
     <p:extLst>
       <p:ext uri="{BB962C8B-B14F-4D97-AF65-F5344CB8AC3E}">
-        <p14:creationId xmlns:p14="http://schemas.microsoft.com/office/powerpoint/2010/main" val="375504752"/>
+        <p14:creationId xmlns:p14="http://schemas.microsoft.com/office/powerpoint/2010/main" val="89803932"/>
       </p:ext>
     </p:extLst>
   </p:cSld>
@@ -798,6 +798,90 @@
             <a:fld id="{38A242E1-1EC6-4946-BE15-AF52B60E34D5}" type="slidenum">
               <a:rPr lang="en-US" smtClean="0"/>
               <a:t>4</a:t>
+            </a:fld>
+            <a:endParaRPr lang="en-US"/>
+          </a:p>
+        </p:txBody>
+      </p:sp>
+    </p:spTree>
+    <p:extLst>
+      <p:ext uri="{BB962C8B-B14F-4D97-AF65-F5344CB8AC3E}">
+        <p14:creationId xmlns:p14="http://schemas.microsoft.com/office/powerpoint/2010/main" val="375504752"/>
+      </p:ext>
+    </p:extLst>
+  </p:cSld>
+  <p:clrMapOvr>
+    <a:masterClrMapping/>
+  </p:clrMapOvr>
+</p:notes>
+</file>
+
+<file path=ppt/notesSlides/notesSlide5.xml><?xml version="1.0" encoding="utf-8"?>
+<p:notes xmlns:a="http://schemas.openxmlformats.org/drawingml/2006/main" xmlns:r="http://schemas.openxmlformats.org/officeDocument/2006/relationships" xmlns:p="http://schemas.openxmlformats.org/presentationml/2006/main">
+  <p:cSld>
+    <p:spTree>
+      <p:nvGrpSpPr>
+        <p:cNvPr id="1" name=""/>
+        <p:cNvGrpSpPr/>
+        <p:nvPr/>
+      </p:nvGrpSpPr>
+      <p:grpSpPr>
+        <a:xfrm>
+          <a:off x="0" y="0"/>
+          <a:ext cx="0" cy="0"/>
+          <a:chOff x="0" y="0"/>
+          <a:chExt cx="0" cy="0"/>
+        </a:xfrm>
+      </p:grpSpPr>
+      <p:sp>
+        <p:nvSpPr>
+          <p:cNvPr id="2" name="Slide Image Placeholder 1"/>
+          <p:cNvSpPr>
+            <a:spLocks noGrp="1" noRot="1" noChangeAspect="1"/>
+          </p:cNvSpPr>
+          <p:nvPr>
+            <p:ph type="sldImg"/>
+          </p:nvPr>
+        </p:nvSpPr>
+        <p:spPr/>
+      </p:sp>
+      <p:sp>
+        <p:nvSpPr>
+          <p:cNvPr id="3" name="Notes Placeholder 2"/>
+          <p:cNvSpPr>
+            <a:spLocks noGrp="1"/>
+          </p:cNvSpPr>
+          <p:nvPr>
+            <p:ph type="body" idx="1"/>
+          </p:nvPr>
+        </p:nvSpPr>
+        <p:spPr/>
+        <p:txBody>
+          <a:bodyPr/>
+          <a:lstStyle/>
+          <a:p>
+            <a:endParaRPr lang="en-US" dirty="0"/>
+          </a:p>
+        </p:txBody>
+      </p:sp>
+      <p:sp>
+        <p:nvSpPr>
+          <p:cNvPr id="4" name="Slide Number Placeholder 3"/>
+          <p:cNvSpPr>
+            <a:spLocks noGrp="1"/>
+          </p:cNvSpPr>
+          <p:nvPr>
+            <p:ph type="sldNum" sz="quarter" idx="10"/>
+          </p:nvPr>
+        </p:nvSpPr>
+        <p:spPr/>
+        <p:txBody>
+          <a:bodyPr/>
+          <a:lstStyle/>
+          <a:p>
+            <a:fld id="{38A242E1-1EC6-4946-BE15-AF52B60E34D5}" type="slidenum">
+              <a:rPr lang="en-US" smtClean="0"/>
+              <a:t>5</a:t>
             </a:fld>
             <a:endParaRPr lang="en-US"/>
           </a:p>
@@ -947,7 +1031,7 @@
           <a:p>
             <a:fld id="{5F84E0A0-940C-2749-B2AE-B5697C37A241}" type="datetimeFigureOut">
               <a:rPr lang="en-US" smtClean="0"/>
-              <a:t>2/15/17</a:t>
+              <a:t>3/1/17</a:t>
             </a:fld>
             <a:endParaRPr lang="en-US"/>
           </a:p>
@@ -1124,7 +1208,7 @@
           <a:p>
             <a:fld id="{5F84E0A0-940C-2749-B2AE-B5697C37A241}" type="datetimeFigureOut">
               <a:rPr lang="en-US" smtClean="0"/>
-              <a:t>2/15/17</a:t>
+              <a:t>3/1/17</a:t>
             </a:fld>
             <a:endParaRPr lang="en-US"/>
           </a:p>
@@ -1304,7 +1388,7 @@
           <a:p>
             <a:fld id="{5F84E0A0-940C-2749-B2AE-B5697C37A241}" type="datetimeFigureOut">
               <a:rPr lang="en-US" smtClean="0"/>
-              <a:t>2/15/17</a:t>
+              <a:t>3/1/17</a:t>
             </a:fld>
             <a:endParaRPr lang="en-US"/>
           </a:p>
@@ -1743,7 +1827,7 @@
           <a:p>
             <a:fld id="{5F84E0A0-940C-2749-B2AE-B5697C37A241}" type="datetimeFigureOut">
               <a:rPr lang="en-US" smtClean="0"/>
-              <a:t>2/15/17</a:t>
+              <a:t>3/1/17</a:t>
             </a:fld>
             <a:endParaRPr lang="en-US"/>
           </a:p>
@@ -1982,7 +2066,7 @@
           <a:p>
             <a:fld id="{5F84E0A0-940C-2749-B2AE-B5697C37A241}" type="datetimeFigureOut">
               <a:rPr lang="en-US" smtClean="0"/>
-              <a:t>2/15/17</a:t>
+              <a:t>3/1/17</a:t>
             </a:fld>
             <a:endParaRPr lang="en-US"/>
           </a:p>
@@ -2356,7 +2440,7 @@
           <a:p>
             <a:fld id="{5F84E0A0-940C-2749-B2AE-B5697C37A241}" type="datetimeFigureOut">
               <a:rPr lang="en-US" smtClean="0"/>
-              <a:t>2/15/17</a:t>
+              <a:t>3/1/17</a:t>
             </a:fld>
             <a:endParaRPr lang="en-US"/>
           </a:p>
@@ -2481,7 +2565,7 @@
           <a:p>
             <a:fld id="{5F84E0A0-940C-2749-B2AE-B5697C37A241}" type="datetimeFigureOut">
               <a:rPr lang="en-US" smtClean="0"/>
-              <a:t>2/15/17</a:t>
+              <a:t>3/1/17</a:t>
             </a:fld>
             <a:endParaRPr lang="en-US"/>
           </a:p>
@@ -2576,7 +2660,7 @@
           <a:p>
             <a:fld id="{5F84E0A0-940C-2749-B2AE-B5697C37A241}" type="datetimeFigureOut">
               <a:rPr lang="en-US" smtClean="0"/>
-              <a:t>2/15/17</a:t>
+              <a:t>3/1/17</a:t>
             </a:fld>
             <a:endParaRPr lang="en-US"/>
           </a:p>
@@ -2853,7 +2937,7 @@
           <a:p>
             <a:fld id="{5F84E0A0-940C-2749-B2AE-B5697C37A241}" type="datetimeFigureOut">
               <a:rPr lang="en-US" smtClean="0"/>
-              <a:t>2/15/17</a:t>
+              <a:t>3/1/17</a:t>
             </a:fld>
             <a:endParaRPr lang="en-US"/>
           </a:p>
@@ -3110,7 +3194,7 @@
           <a:p>
             <a:fld id="{5F84E0A0-940C-2749-B2AE-B5697C37A241}" type="datetimeFigureOut">
               <a:rPr lang="en-US" smtClean="0"/>
-              <a:t>2/15/17</a:t>
+              <a:t>3/1/17</a:t>
             </a:fld>
             <a:endParaRPr lang="en-US"/>
           </a:p>
@@ -3323,7 +3407,7 @@
           <a:p>
             <a:fld id="{C764DE79-268F-4C1A-8933-263129D2AF90}" type="datetimeFigureOut">
               <a:rPr lang="en-US" dirty="0"/>
-              <a:t>2/15/17</a:t>
+              <a:t>3/1/17</a:t>
             </a:fld>
             <a:endParaRPr lang="en-US" dirty="0"/>
           </a:p>
@@ -4162,6 +4246,316 @@
           <a:p>
             <a:r>
               <a:rPr lang="en-US" dirty="0" smtClean="0"/>
+              <a:t>React</a:t>
+            </a:r>
+            <a:endParaRPr lang="en-US" dirty="0"/>
+          </a:p>
+        </p:txBody>
+      </p:sp>
+      <p:sp>
+        <p:nvSpPr>
+          <p:cNvPr id="7" name="Content Placeholder 6"/>
+          <p:cNvSpPr>
+            <a:spLocks noGrp="1"/>
+          </p:cNvSpPr>
+          <p:nvPr>
+            <p:ph idx="1"/>
+          </p:nvPr>
+        </p:nvSpPr>
+        <p:spPr/>
+        <p:txBody>
+          <a:bodyPr/>
+          <a:lstStyle/>
+          <a:p>
+            <a:r>
+              <a:rPr lang="en-US" dirty="0" smtClean="0"/>
+              <a:t>“View” v “MVC” </a:t>
+            </a:r>
+            <a:r>
+              <a:rPr lang="en-US" dirty="0" err="1" smtClean="0"/>
+              <a:t>modelu</a:t>
+            </a:r>
+            <a:endParaRPr lang="en-US" dirty="0" smtClean="0"/>
+          </a:p>
+          <a:p>
+            <a:r>
+              <a:rPr lang="en-US" dirty="0" smtClean="0"/>
+              <a:t>Ne </a:t>
+            </a:r>
+            <a:r>
+              <a:rPr lang="en-US" dirty="0" err="1" smtClean="0"/>
+              <a:t>potrebuje</a:t>
+            </a:r>
+            <a:r>
+              <a:rPr lang="en-US" dirty="0" smtClean="0"/>
+              <a:t> DOM-a (</a:t>
+            </a:r>
+            <a:r>
+              <a:rPr lang="en-US" dirty="0" err="1" smtClean="0"/>
+              <a:t>deluje</a:t>
+            </a:r>
+            <a:r>
+              <a:rPr lang="en-US" dirty="0" smtClean="0"/>
+              <a:t> </a:t>
+            </a:r>
+            <a:r>
+              <a:rPr lang="en-US" dirty="0" err="1" smtClean="0"/>
+              <a:t>na</a:t>
+            </a:r>
+            <a:r>
+              <a:rPr lang="en-US" dirty="0" smtClean="0"/>
+              <a:t> </a:t>
+            </a:r>
+            <a:r>
+              <a:rPr lang="en-US" dirty="0" err="1" smtClean="0"/>
+              <a:t>serverju</a:t>
+            </a:r>
+            <a:r>
+              <a:rPr lang="en-US" dirty="0" smtClean="0"/>
+              <a:t>)</a:t>
+            </a:r>
+          </a:p>
+          <a:p>
+            <a:r>
+              <a:rPr lang="en-US" dirty="0" smtClean="0"/>
+              <a:t>React(</a:t>
+            </a:r>
+            <a:r>
+              <a:rPr lang="en-US" dirty="0" err="1" smtClean="0"/>
+              <a:t>podatki</a:t>
+            </a:r>
+            <a:r>
+              <a:rPr lang="en-US" dirty="0" smtClean="0"/>
+              <a:t>) =&gt; </a:t>
+            </a:r>
+            <a:r>
+              <a:rPr lang="en-US" dirty="0" err="1" smtClean="0"/>
+              <a:t>VirtualDOM</a:t>
+            </a:r>
+            <a:endParaRPr lang="en-US" dirty="0"/>
+          </a:p>
+          <a:p>
+            <a:r>
+              <a:rPr lang="en-US" dirty="0" smtClean="0"/>
+              <a:t>Virtual </a:t>
+            </a:r>
+            <a:r>
+              <a:rPr lang="en-US" dirty="0" smtClean="0"/>
+              <a:t>DOM</a:t>
+            </a:r>
+          </a:p>
+          <a:p>
+            <a:pPr lvl="1"/>
+            <a:r>
+              <a:rPr lang="en-US" dirty="0" err="1" smtClean="0"/>
+              <a:t>čim</a:t>
+            </a:r>
+            <a:r>
+              <a:rPr lang="en-US" dirty="0" smtClean="0"/>
+              <a:t> </a:t>
+            </a:r>
+            <a:r>
+              <a:rPr lang="en-US" dirty="0" err="1" smtClean="0"/>
+              <a:t>manj</a:t>
+            </a:r>
+            <a:r>
+              <a:rPr lang="en-US" dirty="0" smtClean="0"/>
+              <a:t> </a:t>
+            </a:r>
+            <a:r>
+              <a:rPr lang="en-US" dirty="0" err="1" smtClean="0"/>
+              <a:t>interakcij</a:t>
+            </a:r>
+            <a:r>
+              <a:rPr lang="en-US" dirty="0" smtClean="0"/>
+              <a:t> z DOM-om</a:t>
+            </a:r>
+          </a:p>
+          <a:p>
+            <a:pPr lvl="1"/>
+            <a:r>
+              <a:rPr lang="en-US" dirty="0" err="1" smtClean="0"/>
+              <a:t>elementi</a:t>
+            </a:r>
+            <a:r>
+              <a:rPr lang="en-US" dirty="0" smtClean="0"/>
+              <a:t> </a:t>
+            </a:r>
+            <a:r>
+              <a:rPr lang="en-US" dirty="0" err="1" smtClean="0"/>
+              <a:t>predstavljeni</a:t>
+            </a:r>
+            <a:r>
+              <a:rPr lang="en-US" dirty="0" smtClean="0"/>
+              <a:t> </a:t>
+            </a:r>
+            <a:r>
+              <a:rPr lang="en-US" dirty="0" err="1" smtClean="0"/>
+              <a:t>kot</a:t>
+            </a:r>
+            <a:r>
+              <a:rPr lang="en-US" dirty="0" smtClean="0"/>
+              <a:t> </a:t>
+            </a:r>
+            <a:r>
+              <a:rPr lang="en-US" dirty="0" err="1" smtClean="0"/>
+              <a:t>objekti</a:t>
+            </a:r>
+            <a:endParaRPr lang="en-US" dirty="0"/>
+          </a:p>
+          <a:p>
+            <a:pPr marL="345597" lvl="1" indent="0">
+              <a:buNone/>
+            </a:pPr>
+            <a:r>
+              <a:rPr lang="en-US" dirty="0" smtClean="0"/>
+              <a:t> </a:t>
+            </a:r>
+          </a:p>
+          <a:p>
+            <a:pPr marL="345597" lvl="1" indent="0">
+              <a:buNone/>
+            </a:pPr>
+            <a:endParaRPr lang="en-US" dirty="0"/>
+          </a:p>
+        </p:txBody>
+      </p:sp>
+    </p:spTree>
+    <p:extLst>
+      <p:ext uri="{BB962C8B-B14F-4D97-AF65-F5344CB8AC3E}">
+        <p14:creationId xmlns:p14="http://schemas.microsoft.com/office/powerpoint/2010/main" val="23272241"/>
+      </p:ext>
+    </p:extLst>
+  </p:cSld>
+  <p:clrMapOvr>
+    <a:masterClrMapping/>
+  </p:clrMapOvr>
+  <p:timing>
+    <p:tnLst>
+      <p:par>
+        <p:cTn id="1" dur="indefinite" restart="never" nodeType="tmRoot">
+          <p:childTnLst>
+            <p:seq concurrent="1" nextAc="seek">
+              <p:cTn id="2" dur="indefinite" nodeType="mainSeq">
+                <p:childTnLst>
+                  <p:par>
+                    <p:cTn id="3" fill="hold">
+                      <p:stCondLst>
+                        <p:cond delay="indefinite"/>
+                        <p:cond evt="onBegin" delay="0">
+                          <p:tn val="2"/>
+                        </p:cond>
+                      </p:stCondLst>
+                      <p:childTnLst>
+                        <p:par>
+                          <p:cTn id="4" fill="hold">
+                            <p:stCondLst>
+                              <p:cond delay="0"/>
+                            </p:stCondLst>
+                            <p:childTnLst>
+                              <p:par>
+                                <p:cTn id="5" presetID="18" presetClass="entr" presetSubtype="12" fill="hold" grpId="0" nodeType="afterEffect">
+                                  <p:stCondLst>
+                                    <p:cond delay="0"/>
+                                  </p:stCondLst>
+                                  <p:childTnLst>
+                                    <p:set>
+                                      <p:cBhvr>
+                                        <p:cTn id="6" dur="1" fill="hold">
+                                          <p:stCondLst>
+                                            <p:cond delay="0"/>
+                                          </p:stCondLst>
+                                        </p:cTn>
+                                        <p:tgtEl>
+                                          <p:spTgt spid="2"/>
+                                        </p:tgtEl>
+                                        <p:attrNameLst>
+                                          <p:attrName>style.visibility</p:attrName>
+                                        </p:attrNameLst>
+                                      </p:cBhvr>
+                                      <p:to>
+                                        <p:strVal val="visible"/>
+                                      </p:to>
+                                    </p:set>
+                                    <p:animEffect transition="in" filter="strips(downLeft)">
+                                      <p:cBhvr>
+                                        <p:cTn id="7" dur="500"/>
+                                        <p:tgtEl>
+                                          <p:spTgt spid="2"/>
+                                        </p:tgtEl>
+                                      </p:cBhvr>
+                                    </p:animEffect>
+                                  </p:childTnLst>
+                                </p:cTn>
+                              </p:par>
+                            </p:childTnLst>
+                          </p:cTn>
+                        </p:par>
+                      </p:childTnLst>
+                    </p:cTn>
+                  </p:par>
+                </p:childTnLst>
+              </p:cTn>
+              <p:prevCondLst>
+                <p:cond evt="onPrev" delay="0">
+                  <p:tgtEl>
+                    <p:sldTgt/>
+                  </p:tgtEl>
+                </p:cond>
+              </p:prevCondLst>
+              <p:nextCondLst>
+                <p:cond evt="onNext" delay="0">
+                  <p:tgtEl>
+                    <p:sldTgt/>
+                  </p:tgtEl>
+                </p:cond>
+              </p:nextCondLst>
+            </p:seq>
+          </p:childTnLst>
+        </p:cTn>
+      </p:par>
+    </p:tnLst>
+    <p:bldLst>
+      <p:bldP spid="2" grpId="0"/>
+    </p:bldLst>
+  </p:timing>
+</p:sld>
+</file>
+
+<file path=ppt/slides/slide11.xml><?xml version="1.0" encoding="utf-8"?>
+<p:sld xmlns:a="http://schemas.openxmlformats.org/drawingml/2006/main" xmlns:r="http://schemas.openxmlformats.org/officeDocument/2006/relationships" xmlns:p="http://schemas.openxmlformats.org/presentationml/2006/main">
+  <p:cSld>
+    <p:spTree>
+      <p:nvGrpSpPr>
+        <p:cNvPr id="1" name=""/>
+        <p:cNvGrpSpPr/>
+        <p:nvPr/>
+      </p:nvGrpSpPr>
+      <p:grpSpPr>
+        <a:xfrm>
+          <a:off x="0" y="0"/>
+          <a:ext cx="0" cy="0"/>
+          <a:chOff x="0" y="0"/>
+          <a:chExt cx="0" cy="0"/>
+        </a:xfrm>
+      </p:grpSpPr>
+      <p:sp>
+        <p:nvSpPr>
+          <p:cNvPr id="2" name="Title 1"/>
+          <p:cNvSpPr>
+            <a:spLocks noGrp="1"/>
+          </p:cNvSpPr>
+          <p:nvPr>
+            <p:ph type="title"/>
+          </p:nvPr>
+        </p:nvSpPr>
+        <p:spPr/>
+        <p:txBody>
+          <a:bodyPr/>
+          <a:lstStyle/>
+          <a:p>
+            <a:r>
+              <a:rPr lang="en-US" dirty="0" smtClean="0"/>
               <a:t>Hello World Example</a:t>
             </a:r>
             <a:endParaRPr lang="en-US" dirty="0"/>
@@ -4256,15 +4650,7 @@
             <a:pPr algn="ctr"/>
             <a:r>
               <a:rPr lang="en-US" noProof="1" smtClean="0"/>
-              <a:t>&lt;</a:t>
-            </a:r>
-            <a:r>
-              <a:rPr lang="en-US" noProof="1" smtClean="0"/>
-              <a:t>HelloChildren </a:t>
-            </a:r>
-            <a:r>
-              <a:rPr lang="en-US" noProof="1" smtClean="0"/>
-              <a:t>/&gt;</a:t>
+              <a:t>&lt;HelloChildren /&gt;</a:t>
             </a:r>
             <a:endParaRPr lang="en-US" noProof="1"/>
           </a:p>
@@ -4537,7 +4923,7 @@
 </p:sld>
 </file>
 
-<file path=ppt/slides/slide11.xml><?xml version="1.0" encoding="utf-8"?>
+<file path=ppt/slides/slide12.xml><?xml version="1.0" encoding="utf-8"?>
 <p:sld xmlns:a="http://schemas.openxmlformats.org/drawingml/2006/main" xmlns:r="http://schemas.openxmlformats.org/officeDocument/2006/relationships" xmlns:p="http://schemas.openxmlformats.org/presentationml/2006/main">
   <p:cSld>
     <p:spTree>
@@ -4758,7 +5144,7 @@
 </p:sld>
 </file>
 
-<file path=ppt/slides/slide12.xml><?xml version="1.0" encoding="utf-8"?>
+<file path=ppt/slides/slide13.xml><?xml version="1.0" encoding="utf-8"?>
 <p:sld xmlns:a="http://schemas.openxmlformats.org/drawingml/2006/main" xmlns:r="http://schemas.openxmlformats.org/officeDocument/2006/relationships" xmlns:p="http://schemas.openxmlformats.org/presentationml/2006/main">
   <p:cSld>
     <p:spTree>
@@ -4854,9 +5240,9 @@
         <p:grpSpPr>
           <a:xfrm>
             <a:off x="3735740" y="2357453"/>
-            <a:ext cx="1743958" cy="918642"/>
+            <a:ext cx="1743958" cy="1102794"/>
             <a:chOff x="1508289" y="2177590"/>
-            <a:chExt cx="1743958" cy="918642"/>
+            <a:chExt cx="1743958" cy="1102794"/>
           </a:xfrm>
         </p:grpSpPr>
         <p:sp>
@@ -4868,7 +5254,7 @@
           <p:spPr>
             <a:xfrm>
               <a:off x="1508289" y="2290712"/>
-              <a:ext cx="1743958" cy="805520"/>
+              <a:ext cx="1743958" cy="989672"/>
             </a:xfrm>
             <a:prstGeom prst="rect">
               <a:avLst/>
@@ -4921,7 +5307,18 @@
               </a:pPr>
               <a:r>
                 <a:rPr lang="sl-SI" dirty="0" smtClean="0"/>
-                <a:t>timing: boolean</a:t>
+                <a:t>isRunning: boolean</a:t>
+              </a:r>
+            </a:p>
+            <a:p>
+              <a:pPr>
+                <a:lnSpc>
+                  <a:spcPts val="1800"/>
+                </a:lnSpc>
+              </a:pPr>
+              <a:r>
+                <a:rPr lang="sl-SI" dirty="0" smtClean="0"/>
+                <a:t>timer: ?any</a:t>
               </a:r>
             </a:p>
           </p:txBody>
@@ -4990,7 +5387,7 @@
 </p:sld>
 </file>
 
-<file path=ppt/slides/slide13.xml><?xml version="1.0" encoding="utf-8"?>
+<file path=ppt/slides/slide14.xml><?xml version="1.0" encoding="utf-8"?>
 <p:sld xmlns:a="http://schemas.openxmlformats.org/drawingml/2006/main" xmlns:r="http://schemas.openxmlformats.org/officeDocument/2006/relationships" xmlns:p="http://schemas.openxmlformats.org/presentationml/2006/main">
   <p:cSld>
     <p:spTree>
@@ -5233,7 +5630,7 @@
 </p:sld>
 </file>
 
-<file path=ppt/slides/slide14.xml><?xml version="1.0" encoding="utf-8"?>
+<file path=ppt/slides/slide15.xml><?xml version="1.0" encoding="utf-8"?>
 <p:sld xmlns:a="http://schemas.openxmlformats.org/drawingml/2006/main" xmlns:r="http://schemas.openxmlformats.org/officeDocument/2006/relationships" xmlns:p="http://schemas.openxmlformats.org/presentationml/2006/main">
   <p:cSld>
     <p:spTree>
@@ -6413,7 +6810,7 @@
 </p:sld>
 </file>
 
-<file path=ppt/slides/slide15.xml><?xml version="1.0" encoding="utf-8"?>
+<file path=ppt/slides/slide16.xml><?xml version="1.0" encoding="utf-8"?>
 <p:sld xmlns:a="http://schemas.openxmlformats.org/drawingml/2006/main" xmlns:r="http://schemas.openxmlformats.org/officeDocument/2006/relationships" xmlns:p="http://schemas.openxmlformats.org/presentationml/2006/main">
   <p:cSld>
     <p:spTree>
@@ -6882,475 +7279,6 @@
 </p:sld>
 </file>
 
-<file path=ppt/slides/slide16.xml><?xml version="1.0" encoding="utf-8"?>
-<p:sld xmlns:a="http://schemas.openxmlformats.org/drawingml/2006/main" xmlns:r="http://schemas.openxmlformats.org/officeDocument/2006/relationships" xmlns:p="http://schemas.openxmlformats.org/presentationml/2006/main">
-  <p:cSld>
-    <p:spTree>
-      <p:nvGrpSpPr>
-        <p:cNvPr id="1" name=""/>
-        <p:cNvGrpSpPr/>
-        <p:nvPr/>
-      </p:nvGrpSpPr>
-      <p:grpSpPr>
-        <a:xfrm>
-          <a:off x="0" y="0"/>
-          <a:ext cx="0" cy="0"/>
-          <a:chOff x="0" y="0"/>
-          <a:chExt cx="0" cy="0"/>
-        </a:xfrm>
-      </p:grpSpPr>
-      <p:sp>
-        <p:nvSpPr>
-          <p:cNvPr id="2" name="Title 1"/>
-          <p:cNvSpPr>
-            <a:spLocks noGrp="1"/>
-          </p:cNvSpPr>
-          <p:nvPr>
-            <p:ph type="title"/>
-          </p:nvPr>
-        </p:nvSpPr>
-        <p:spPr/>
-        <p:txBody>
-          <a:bodyPr/>
-          <a:lstStyle/>
-          <a:p>
-            <a:r>
-              <a:rPr lang="en-US" dirty="0" smtClean="0"/>
-              <a:t>React Router Example</a:t>
-            </a:r>
-            <a:endParaRPr lang="en-US" dirty="0"/>
-          </a:p>
-        </p:txBody>
-      </p:sp>
-      <p:sp>
-        <p:nvSpPr>
-          <p:cNvPr id="5" name="Rectangle 4"/>
-          <p:cNvSpPr/>
-          <p:nvPr/>
-        </p:nvSpPr>
-        <p:spPr>
-          <a:xfrm>
-            <a:off x="633562" y="1625258"/>
-            <a:ext cx="1743958" cy="509048"/>
-          </a:xfrm>
-          <a:prstGeom prst="rect">
-            <a:avLst/>
-          </a:prstGeom>
-          <a:ln>
-            <a:noFill/>
-          </a:ln>
-        </p:spPr>
-        <p:style>
-          <a:lnRef idx="2">
-            <a:schemeClr val="accent1">
-              <a:shade val="50000"/>
-            </a:schemeClr>
-          </a:lnRef>
-          <a:fillRef idx="1">
-            <a:schemeClr val="accent1"/>
-          </a:fillRef>
-          <a:effectRef idx="0">
-            <a:schemeClr val="accent1"/>
-          </a:effectRef>
-          <a:fontRef idx="minor">
-            <a:schemeClr val="lt1"/>
-          </a:fontRef>
-        </p:style>
-        <p:txBody>
-          <a:bodyPr rtlCol="0" anchor="ctr"/>
-          <a:lstStyle/>
-          <a:p>
-            <a:pPr algn="ctr"/>
-            <a:r>
-              <a:rPr lang="en-US" noProof="1" smtClean="0"/>
-              <a:t>&lt;Navbar /&gt;</a:t>
-            </a:r>
-            <a:endParaRPr lang="en-US" noProof="1"/>
-          </a:p>
-        </p:txBody>
-      </p:sp>
-      <p:sp>
-        <p:nvSpPr>
-          <p:cNvPr id="8" name="Rectangle 7"/>
-          <p:cNvSpPr/>
-          <p:nvPr/>
-        </p:nvSpPr>
-        <p:spPr>
-          <a:xfrm>
-            <a:off x="3042273" y="1632361"/>
-            <a:ext cx="1743958" cy="509048"/>
-          </a:xfrm>
-          <a:prstGeom prst="rect">
-            <a:avLst/>
-          </a:prstGeom>
-          <a:ln>
-            <a:noFill/>
-          </a:ln>
-        </p:spPr>
-        <p:style>
-          <a:lnRef idx="2">
-            <a:schemeClr val="accent1">
-              <a:shade val="50000"/>
-            </a:schemeClr>
-          </a:lnRef>
-          <a:fillRef idx="1">
-            <a:schemeClr val="accent1"/>
-          </a:fillRef>
-          <a:effectRef idx="0">
-            <a:schemeClr val="accent1"/>
-          </a:effectRef>
-          <a:fontRef idx="minor">
-            <a:schemeClr val="lt1"/>
-          </a:fontRef>
-        </p:style>
-        <p:txBody>
-          <a:bodyPr rtlCol="0" anchor="ctr"/>
-          <a:lstStyle/>
-          <a:p>
-            <a:pPr algn="ctr"/>
-            <a:r>
-              <a:rPr lang="en-US" noProof="1" smtClean="0"/>
-              <a:t>&lt;Route /&gt;</a:t>
-            </a:r>
-            <a:endParaRPr lang="en-US" noProof="1"/>
-          </a:p>
-        </p:txBody>
-      </p:sp>
-      <p:grpSp>
-        <p:nvGrpSpPr>
-          <p:cNvPr id="11" name="Group 10"/>
-          <p:cNvGrpSpPr/>
-          <p:nvPr/>
-        </p:nvGrpSpPr>
-        <p:grpSpPr>
-          <a:xfrm>
-            <a:off x="3042273" y="2370947"/>
-            <a:ext cx="2408500" cy="1163024"/>
-            <a:chOff x="1508288" y="2177590"/>
-            <a:chExt cx="2408500" cy="1163024"/>
-          </a:xfrm>
-        </p:grpSpPr>
-        <p:sp>
-          <p:nvSpPr>
-            <p:cNvPr id="12" name="Rectangle 11"/>
-            <p:cNvSpPr/>
-            <p:nvPr/>
-          </p:nvSpPr>
-          <p:spPr>
-            <a:xfrm>
-              <a:off x="1508288" y="2290712"/>
-              <a:ext cx="2408500" cy="1049902"/>
-            </a:xfrm>
-            <a:prstGeom prst="rect">
-              <a:avLst/>
-            </a:prstGeom>
-            <a:solidFill>
-              <a:schemeClr val="accent2">
-                <a:lumMod val="60000"/>
-                <a:lumOff val="40000"/>
-              </a:schemeClr>
-            </a:solidFill>
-            <a:ln>
-              <a:noFill/>
-            </a:ln>
-          </p:spPr>
-          <p:style>
-            <a:lnRef idx="2">
-              <a:schemeClr val="accent1">
-                <a:shade val="50000"/>
-              </a:schemeClr>
-            </a:lnRef>
-            <a:fillRef idx="1">
-              <a:schemeClr val="accent1"/>
-            </a:fillRef>
-            <a:effectRef idx="0">
-              <a:schemeClr val="accent1"/>
-            </a:effectRef>
-            <a:fontRef idx="minor">
-              <a:schemeClr val="lt1"/>
-            </a:fontRef>
-          </p:style>
-          <p:txBody>
-            <a:bodyPr vert="horz" lIns="90000" tIns="180000" rIns="90000" bIns="90000" rtlCol="0" anchor="t" anchorCtr="0"/>
-            <a:lstStyle/>
-            <a:p>
-              <a:pPr>
-                <a:lnSpc>
-                  <a:spcPts val="1800"/>
-                </a:lnSpc>
-              </a:pPr>
-              <a:r>
-                <a:rPr lang="sl-SI" dirty="0" smtClean="0"/>
-                <a:t>exact?: boolean</a:t>
-              </a:r>
-            </a:p>
-            <a:p>
-              <a:pPr>
-                <a:lnSpc>
-                  <a:spcPts val="1800"/>
-                </a:lnSpc>
-              </a:pPr>
-              <a:r>
-                <a:rPr lang="sl-SI" dirty="0" smtClean="0"/>
-                <a:t>path: string</a:t>
-              </a:r>
-            </a:p>
-            <a:p>
-              <a:pPr>
-                <a:lnSpc>
-                  <a:spcPts val="1800"/>
-                </a:lnSpc>
-              </a:pPr>
-              <a:r>
-                <a:rPr lang="sl-SI" dirty="0" smtClean="0"/>
-                <a:t>component: ReactComponent</a:t>
-              </a:r>
-            </a:p>
-          </p:txBody>
-        </p:sp>
-        <p:sp>
-          <p:nvSpPr>
-            <p:cNvPr id="13" name="Rectangle 12"/>
-            <p:cNvSpPr/>
-            <p:nvPr/>
-          </p:nvSpPr>
-          <p:spPr>
-            <a:xfrm>
-              <a:off x="1508289" y="2177590"/>
-              <a:ext cx="904973" cy="226243"/>
-            </a:xfrm>
-            <a:prstGeom prst="rect">
-              <a:avLst/>
-            </a:prstGeom>
-            <a:solidFill>
-              <a:schemeClr val="accent2"/>
-            </a:solidFill>
-            <a:ln>
-              <a:noFill/>
-            </a:ln>
-          </p:spPr>
-          <p:style>
-            <a:lnRef idx="2">
-              <a:schemeClr val="accent1">
-                <a:shade val="50000"/>
-              </a:schemeClr>
-            </a:lnRef>
-            <a:fillRef idx="1">
-              <a:schemeClr val="accent1"/>
-            </a:fillRef>
-            <a:effectRef idx="0">
-              <a:schemeClr val="accent1"/>
-            </a:effectRef>
-            <a:fontRef idx="minor">
-              <a:schemeClr val="lt1"/>
-            </a:fontRef>
-          </p:style>
-          <p:txBody>
-            <a:bodyPr rtlCol="0" anchor="ctr"/>
-            <a:lstStyle/>
-            <a:p>
-              <a:pPr algn="ctr"/>
-              <a:r>
-                <a:rPr lang="sl-SI" sz="1200" dirty="0" smtClean="0"/>
-                <a:t>props</a:t>
-              </a:r>
-              <a:endParaRPr sz="1200" dirty="0"/>
-            </a:p>
-          </p:txBody>
-        </p:sp>
-      </p:grpSp>
-      <p:sp>
-        <p:nvSpPr>
-          <p:cNvPr id="18" name="Rectangle 17"/>
-          <p:cNvSpPr/>
-          <p:nvPr/>
-        </p:nvSpPr>
-        <p:spPr>
-          <a:xfrm>
-            <a:off x="6022014" y="1625258"/>
-            <a:ext cx="1743958" cy="509048"/>
-          </a:xfrm>
-          <a:prstGeom prst="rect">
-            <a:avLst/>
-          </a:prstGeom>
-          <a:ln>
-            <a:noFill/>
-          </a:ln>
-        </p:spPr>
-        <p:style>
-          <a:lnRef idx="2">
-            <a:schemeClr val="accent1">
-              <a:shade val="50000"/>
-            </a:schemeClr>
-          </a:lnRef>
-          <a:fillRef idx="1">
-            <a:schemeClr val="accent1"/>
-          </a:fillRef>
-          <a:effectRef idx="0">
-            <a:schemeClr val="accent1"/>
-          </a:effectRef>
-          <a:fontRef idx="minor">
-            <a:schemeClr val="lt1"/>
-          </a:fontRef>
-        </p:style>
-        <p:txBody>
-          <a:bodyPr rtlCol="0" anchor="ctr"/>
-          <a:lstStyle/>
-          <a:p>
-            <a:pPr algn="ctr"/>
-            <a:r>
-              <a:rPr lang="en-US" noProof="1" smtClean="0"/>
-              <a:t>&lt;Route /&gt;</a:t>
-            </a:r>
-            <a:endParaRPr lang="en-US" noProof="1"/>
-          </a:p>
-        </p:txBody>
-      </p:sp>
-      <p:grpSp>
-        <p:nvGrpSpPr>
-          <p:cNvPr id="19" name="Group 18"/>
-          <p:cNvGrpSpPr/>
-          <p:nvPr/>
-        </p:nvGrpSpPr>
-        <p:grpSpPr>
-          <a:xfrm>
-            <a:off x="6022014" y="2370947"/>
-            <a:ext cx="2408500" cy="894766"/>
-            <a:chOff x="1508288" y="2177590"/>
-            <a:chExt cx="2408500" cy="894766"/>
-          </a:xfrm>
-        </p:grpSpPr>
-        <p:sp>
-          <p:nvSpPr>
-            <p:cNvPr id="20" name="Rectangle 19"/>
-            <p:cNvSpPr/>
-            <p:nvPr/>
-          </p:nvSpPr>
-          <p:spPr>
-            <a:xfrm>
-              <a:off x="1508288" y="2290712"/>
-              <a:ext cx="2408500" cy="781644"/>
-            </a:xfrm>
-            <a:prstGeom prst="rect">
-              <a:avLst/>
-            </a:prstGeom>
-            <a:solidFill>
-              <a:schemeClr val="accent2">
-                <a:lumMod val="60000"/>
-                <a:lumOff val="40000"/>
-              </a:schemeClr>
-            </a:solidFill>
-            <a:ln>
-              <a:noFill/>
-            </a:ln>
-          </p:spPr>
-          <p:style>
-            <a:lnRef idx="2">
-              <a:schemeClr val="accent1">
-                <a:shade val="50000"/>
-              </a:schemeClr>
-            </a:lnRef>
-            <a:fillRef idx="1">
-              <a:schemeClr val="accent1"/>
-            </a:fillRef>
-            <a:effectRef idx="0">
-              <a:schemeClr val="accent1"/>
-            </a:effectRef>
-            <a:fontRef idx="minor">
-              <a:schemeClr val="lt1"/>
-            </a:fontRef>
-          </p:style>
-          <p:txBody>
-            <a:bodyPr vert="horz" lIns="90000" tIns="180000" rIns="90000" bIns="90000" rtlCol="0" anchor="t" anchorCtr="0"/>
-            <a:lstStyle/>
-            <a:p>
-              <a:pPr>
-                <a:lnSpc>
-                  <a:spcPts val="1800"/>
-                </a:lnSpc>
-              </a:pPr>
-              <a:r>
-                <a:rPr lang="sl-SI" dirty="0" smtClean="0"/>
-                <a:t>path: string</a:t>
-              </a:r>
-            </a:p>
-            <a:p>
-              <a:pPr>
-                <a:lnSpc>
-                  <a:spcPts val="1800"/>
-                </a:lnSpc>
-              </a:pPr>
-              <a:r>
-                <a:rPr lang="sl-SI" dirty="0" smtClean="0"/>
-                <a:t>component: ReactComponent</a:t>
-              </a:r>
-            </a:p>
-          </p:txBody>
-        </p:sp>
-        <p:sp>
-          <p:nvSpPr>
-            <p:cNvPr id="21" name="Rectangle 20"/>
-            <p:cNvSpPr/>
-            <p:nvPr/>
-          </p:nvSpPr>
-          <p:spPr>
-            <a:xfrm>
-              <a:off x="1508289" y="2177590"/>
-              <a:ext cx="904973" cy="226243"/>
-            </a:xfrm>
-            <a:prstGeom prst="rect">
-              <a:avLst/>
-            </a:prstGeom>
-            <a:solidFill>
-              <a:schemeClr val="accent2"/>
-            </a:solidFill>
-            <a:ln>
-              <a:noFill/>
-            </a:ln>
-          </p:spPr>
-          <p:style>
-            <a:lnRef idx="2">
-              <a:schemeClr val="accent1">
-                <a:shade val="50000"/>
-              </a:schemeClr>
-            </a:lnRef>
-            <a:fillRef idx="1">
-              <a:schemeClr val="accent1"/>
-            </a:fillRef>
-            <a:effectRef idx="0">
-              <a:schemeClr val="accent1"/>
-            </a:effectRef>
-            <a:fontRef idx="minor">
-              <a:schemeClr val="lt1"/>
-            </a:fontRef>
-          </p:style>
-          <p:txBody>
-            <a:bodyPr rtlCol="0" anchor="ctr"/>
-            <a:lstStyle/>
-            <a:p>
-              <a:pPr algn="ctr"/>
-              <a:r>
-                <a:rPr lang="sl-SI" sz="1200" dirty="0" smtClean="0"/>
-                <a:t>props</a:t>
-              </a:r>
-              <a:endParaRPr sz="1200" dirty="0"/>
-            </a:p>
-          </p:txBody>
-        </p:sp>
-      </p:grpSp>
-    </p:spTree>
-    <p:extLst>
-      <p:ext uri="{BB962C8B-B14F-4D97-AF65-F5344CB8AC3E}">
-        <p14:creationId xmlns:p14="http://schemas.microsoft.com/office/powerpoint/2010/main" val="1621729995"/>
-      </p:ext>
-    </p:extLst>
-  </p:cSld>
-  <p:clrMapOvr>
-    <a:masterClrMapping/>
-  </p:clrMapOvr>
-</p:sld>
-</file>
-
 <file path=ppt/slides/slide2.xml><?xml version="1.0" encoding="utf-8"?>
 <p:sld xmlns:a="http://schemas.openxmlformats.org/drawingml/2006/main" xmlns:r="http://schemas.openxmlformats.org/officeDocument/2006/relationships" xmlns:p="http://schemas.openxmlformats.org/presentationml/2006/main">
   <p:cSld>
@@ -7384,8 +7312,8 @@
           <a:lstStyle/>
           <a:p>
             <a:r>
-              <a:rPr lang="en-US" dirty="0" err="1" smtClean="0"/>
-              <a:t>ES@next</a:t>
+              <a:rPr lang="en-US" dirty="0" smtClean="0"/>
+              <a:t>Agenda</a:t>
             </a:r>
             <a:endParaRPr lang="en-US" dirty="0"/>
           </a:p>
@@ -7403,90 +7331,140 @@
         </p:nvSpPr>
         <p:spPr/>
         <p:txBody>
-          <a:bodyPr/>
+          <a:bodyPr>
+            <a:normAutofit fontScale="92500"/>
+          </a:bodyPr>
           <a:lstStyle/>
           <a:p>
             <a:r>
-              <a:rPr lang="en-US" dirty="0" err="1" smtClean="0"/>
-              <a:t>Vedno</a:t>
-            </a:r>
-            <a:r>
-              <a:rPr lang="en-US" dirty="0" smtClean="0"/>
-              <a:t> </a:t>
-            </a:r>
-            <a:r>
-              <a:rPr lang="en-US" dirty="0" err="1" smtClean="0"/>
-              <a:t>bolj</a:t>
-            </a:r>
-            <a:r>
-              <a:rPr lang="en-US" dirty="0" smtClean="0"/>
-              <a:t> </a:t>
-            </a:r>
-            <a:r>
-              <a:rPr lang="en-US" dirty="0" err="1" smtClean="0"/>
-              <a:t>zahtevne</a:t>
-            </a:r>
-            <a:r>
-              <a:rPr lang="en-US" dirty="0" smtClean="0"/>
-              <a:t> </a:t>
-            </a:r>
-            <a:r>
-              <a:rPr lang="en-US" dirty="0" err="1" smtClean="0"/>
-              <a:t>spletne</a:t>
-            </a:r>
-            <a:r>
-              <a:rPr lang="en-US" dirty="0" smtClean="0"/>
-              <a:t> </a:t>
-            </a:r>
-            <a:r>
-              <a:rPr lang="en-US" dirty="0" err="1" smtClean="0"/>
-              <a:t>aplikacije</a:t>
-            </a:r>
-            <a:endParaRPr lang="en-US" dirty="0" smtClean="0"/>
-          </a:p>
-          <a:p>
-            <a:r>
-              <a:rPr lang="en-US" dirty="0" err="1" smtClean="0"/>
-              <a:t>Podpiranje</a:t>
-            </a:r>
-            <a:r>
-              <a:rPr lang="en-US" dirty="0" smtClean="0"/>
-              <a:t> </a:t>
-            </a:r>
-            <a:r>
-              <a:rPr lang="en-US" dirty="0" err="1" smtClean="0"/>
-              <a:t>starih</a:t>
-            </a:r>
-            <a:r>
-              <a:rPr lang="en-US" dirty="0" smtClean="0"/>
-              <a:t> </a:t>
-            </a:r>
-            <a:r>
-              <a:rPr lang="en-US" dirty="0" err="1" smtClean="0"/>
-              <a:t>brskalnikov</a:t>
-            </a:r>
-            <a:endParaRPr lang="en-US" dirty="0" smtClean="0"/>
-          </a:p>
-          <a:p>
-            <a:r>
-              <a:rPr lang="en-US" dirty="0" err="1" smtClean="0"/>
-              <a:t>Nove</a:t>
-            </a:r>
-            <a:r>
-              <a:rPr lang="en-US" dirty="0" smtClean="0"/>
-              <a:t> </a:t>
-            </a:r>
-            <a:r>
-              <a:rPr lang="en-US" dirty="0" err="1" smtClean="0"/>
-              <a:t>funkcionalnosti</a:t>
+              <a:rPr lang="en-US" dirty="0" err="1"/>
+              <a:t>na</a:t>
             </a:r>
             <a:r>
               <a:rPr lang="en-US" dirty="0"/>
               <a:t> </a:t>
             </a:r>
             <a:r>
-              <a:rPr lang="en-US" dirty="0" smtClean="0"/>
-              <a:t>(“syntactic sugar”)</a:t>
+              <a:rPr lang="en-US" dirty="0" err="1"/>
+              <a:t>kratko</a:t>
+            </a:r>
+            <a:r>
+              <a:rPr lang="en-US" dirty="0"/>
+              <a:t> o ES2015, ES2016, JSX</a:t>
+            </a:r>
+          </a:p>
+          <a:p>
+            <a:r>
+              <a:rPr lang="en-US" dirty="0"/>
+              <a:t>hello world (</a:t>
+            </a:r>
+            <a:r>
+              <a:rPr lang="en-US" dirty="0" err="1"/>
+              <a:t>React.Props</a:t>
+            </a:r>
+            <a:r>
+              <a:rPr lang="en-US" dirty="0"/>
+              <a:t>, </a:t>
+            </a:r>
+            <a:r>
+              <a:rPr lang="en-US" dirty="0" err="1"/>
+              <a:t>React.Children</a:t>
+            </a:r>
+            <a:r>
+              <a:rPr lang="en-US" dirty="0"/>
+              <a:t>)</a:t>
+            </a:r>
+          </a:p>
+          <a:p>
+            <a:r>
+              <a:rPr lang="en-US" dirty="0"/>
+              <a:t>data flow, </a:t>
+            </a:r>
+            <a:r>
+              <a:rPr lang="en-US" dirty="0" err="1"/>
+              <a:t>komunikacija</a:t>
+            </a:r>
+            <a:r>
+              <a:rPr lang="en-US" dirty="0"/>
+              <a:t> med </a:t>
+            </a:r>
+            <a:r>
+              <a:rPr lang="en-US" dirty="0" err="1"/>
+              <a:t>komponentami</a:t>
+            </a:r>
+            <a:r>
+              <a:rPr lang="en-US" dirty="0"/>
+              <a:t> (</a:t>
+            </a:r>
+            <a:r>
+              <a:rPr lang="en-US" dirty="0" err="1"/>
+              <a:t>React.State</a:t>
+            </a:r>
+            <a:r>
+              <a:rPr lang="en-US" dirty="0"/>
+              <a:t>)</a:t>
+            </a:r>
+          </a:p>
+          <a:p>
+            <a:r>
+              <a:rPr lang="en-US" dirty="0" err="1"/>
+              <a:t>navigacija</a:t>
+            </a:r>
+            <a:r>
+              <a:rPr lang="en-US" dirty="0"/>
+              <a:t> (React Router)</a:t>
+            </a:r>
+          </a:p>
+          <a:p>
+            <a:r>
+              <a:rPr lang="en-US" dirty="0"/>
+              <a:t>CSS in JS (</a:t>
+            </a:r>
+            <a:r>
+              <a:rPr lang="en-US" dirty="0" err="1"/>
+              <a:t>className</a:t>
+            </a:r>
+            <a:r>
+              <a:rPr lang="en-US" dirty="0"/>
+              <a:t>, inline styles, </a:t>
+            </a:r>
+            <a:r>
+              <a:rPr lang="en-US" dirty="0" err="1"/>
+              <a:t>aphrodite</a:t>
+            </a:r>
+            <a:r>
+              <a:rPr lang="en-US" dirty="0"/>
+              <a:t>)</a:t>
+            </a:r>
+          </a:p>
+          <a:p>
+            <a:r>
+              <a:rPr lang="en-US" dirty="0"/>
+              <a:t>primer </a:t>
+            </a:r>
+            <a:r>
+              <a:rPr lang="en-US" dirty="0" err="1"/>
+              <a:t>gradnje</a:t>
+            </a:r>
+            <a:r>
+              <a:rPr lang="en-US" dirty="0"/>
+              <a:t> </a:t>
+            </a:r>
+            <a:r>
+              <a:rPr lang="en-US" dirty="0" err="1"/>
+              <a:t>aplikacije</a:t>
+            </a:r>
+            <a:r>
+              <a:rPr lang="en-US" dirty="0"/>
+              <a:t> </a:t>
+            </a:r>
+            <a:r>
+              <a:rPr lang="en-US" dirty="0" err="1"/>
+              <a:t>za</a:t>
+            </a:r>
+            <a:r>
+              <a:rPr lang="en-US" dirty="0"/>
+              <a:t> Spotify</a:t>
             </a:r>
           </a:p>
           <a:p>
@@ -7501,6 +7479,270 @@
     <p:extLst>
       <p:ext uri="{BB962C8B-B14F-4D97-AF65-F5344CB8AC3E}">
         <p14:creationId xmlns:p14="http://schemas.microsoft.com/office/powerpoint/2010/main" val="262939495"/>
+      </p:ext>
+    </p:extLst>
+  </p:cSld>
+  <p:clrMapOvr>
+    <a:masterClrMapping/>
+  </p:clrMapOvr>
+  <mc:AlternateContent xmlns:mc="http://schemas.openxmlformats.org/markup-compatibility/2006" xmlns:p14="http://schemas.microsoft.com/office/powerpoint/2010/main">
+    <mc:Choice Requires="p14">
+      <p:transition spd="med" p14:dur="700">
+        <p:fade/>
+      </p:transition>
+    </mc:Choice>
+    <mc:Fallback xmlns="">
+      <p:transition spd="med">
+        <p:fade/>
+      </p:transition>
+    </mc:Fallback>
+  </mc:AlternateContent>
+  <p:timing>
+    <p:tnLst>
+      <p:par>
+        <p:cTn id="1" dur="indefinite" restart="never" nodeType="tmRoot">
+          <p:childTnLst>
+            <p:seq concurrent="1" nextAc="seek">
+              <p:cTn id="2" dur="indefinite" nodeType="mainSeq">
+                <p:childTnLst>
+                  <p:par>
+                    <p:cTn id="3" fill="hold">
+                      <p:stCondLst>
+                        <p:cond delay="indefinite"/>
+                        <p:cond evt="onBegin" delay="0">
+                          <p:tn val="2"/>
+                        </p:cond>
+                      </p:stCondLst>
+                      <p:childTnLst>
+                        <p:par>
+                          <p:cTn id="4" fill="hold">
+                            <p:stCondLst>
+                              <p:cond delay="0"/>
+                            </p:stCondLst>
+                            <p:childTnLst>
+                              <p:par>
+                                <p:cTn id="5" presetID="18" presetClass="entr" presetSubtype="12" fill="hold" grpId="0" nodeType="afterEffect">
+                                  <p:stCondLst>
+                                    <p:cond delay="0"/>
+                                  </p:stCondLst>
+                                  <p:childTnLst>
+                                    <p:set>
+                                      <p:cBhvr>
+                                        <p:cTn id="6" dur="1" fill="hold">
+                                          <p:stCondLst>
+                                            <p:cond delay="0"/>
+                                          </p:stCondLst>
+                                        </p:cTn>
+                                        <p:tgtEl>
+                                          <p:spTgt spid="2"/>
+                                        </p:tgtEl>
+                                        <p:attrNameLst>
+                                          <p:attrName>style.visibility</p:attrName>
+                                        </p:attrNameLst>
+                                      </p:cBhvr>
+                                      <p:to>
+                                        <p:strVal val="visible"/>
+                                      </p:to>
+                                    </p:set>
+                                    <p:animEffect transition="in" filter="strips(downLeft)">
+                                      <p:cBhvr>
+                                        <p:cTn id="7" dur="500"/>
+                                        <p:tgtEl>
+                                          <p:spTgt spid="2"/>
+                                        </p:tgtEl>
+                                      </p:cBhvr>
+                                    </p:animEffect>
+                                  </p:childTnLst>
+                                </p:cTn>
+                              </p:par>
+                            </p:childTnLst>
+                          </p:cTn>
+                        </p:par>
+                      </p:childTnLst>
+                    </p:cTn>
+                  </p:par>
+                </p:childTnLst>
+              </p:cTn>
+              <p:prevCondLst>
+                <p:cond evt="onPrev" delay="0">
+                  <p:tgtEl>
+                    <p:sldTgt/>
+                  </p:tgtEl>
+                </p:cond>
+              </p:prevCondLst>
+              <p:nextCondLst>
+                <p:cond evt="onNext" delay="0">
+                  <p:tgtEl>
+                    <p:sldTgt/>
+                  </p:tgtEl>
+                </p:cond>
+              </p:nextCondLst>
+            </p:seq>
+          </p:childTnLst>
+        </p:cTn>
+      </p:par>
+    </p:tnLst>
+    <p:bldLst>
+      <p:bldP spid="2" grpId="0"/>
+    </p:bldLst>
+  </p:timing>
+</p:sld>
+</file>
+
+<file path=ppt/slides/slide3.xml><?xml version="1.0" encoding="utf-8"?>
+<p:sld xmlns:a="http://schemas.openxmlformats.org/drawingml/2006/main" xmlns:r="http://schemas.openxmlformats.org/officeDocument/2006/relationships" xmlns:p="http://schemas.openxmlformats.org/presentationml/2006/main">
+  <p:cSld>
+    <p:spTree>
+      <p:nvGrpSpPr>
+        <p:cNvPr id="1" name=""/>
+        <p:cNvGrpSpPr/>
+        <p:nvPr/>
+      </p:nvGrpSpPr>
+      <p:grpSpPr>
+        <a:xfrm>
+          <a:off x="0" y="0"/>
+          <a:ext cx="0" cy="0"/>
+          <a:chOff x="0" y="0"/>
+          <a:chExt cx="0" cy="0"/>
+        </a:xfrm>
+      </p:grpSpPr>
+      <p:sp>
+        <p:nvSpPr>
+          <p:cNvPr id="2" name="Title 1"/>
+          <p:cNvSpPr>
+            <a:spLocks noGrp="1"/>
+          </p:cNvSpPr>
+          <p:nvPr>
+            <p:ph type="title"/>
+          </p:nvPr>
+        </p:nvSpPr>
+        <p:spPr/>
+        <p:txBody>
+          <a:bodyPr/>
+          <a:lstStyle/>
+          <a:p>
+            <a:r>
+              <a:rPr lang="en-US" dirty="0" err="1" smtClean="0"/>
+              <a:t>ES@next</a:t>
+            </a:r>
+            <a:endParaRPr lang="en-US" dirty="0"/>
+          </a:p>
+        </p:txBody>
+      </p:sp>
+      <p:sp>
+        <p:nvSpPr>
+          <p:cNvPr id="3" name="Content Placeholder 2"/>
+          <p:cNvSpPr>
+            <a:spLocks noGrp="1"/>
+          </p:cNvSpPr>
+          <p:nvPr>
+            <p:ph idx="1"/>
+          </p:nvPr>
+        </p:nvSpPr>
+        <p:spPr/>
+        <p:txBody>
+          <a:bodyPr/>
+          <a:lstStyle/>
+          <a:p>
+            <a:r>
+              <a:rPr lang="en-US" dirty="0" err="1" smtClean="0"/>
+              <a:t>Vedno</a:t>
+            </a:r>
+            <a:r>
+              <a:rPr lang="en-US" dirty="0" smtClean="0"/>
+              <a:t> </a:t>
+            </a:r>
+            <a:r>
+              <a:rPr lang="en-US" dirty="0" err="1" smtClean="0"/>
+              <a:t>bolj</a:t>
+            </a:r>
+            <a:r>
+              <a:rPr lang="en-US" dirty="0" smtClean="0"/>
+              <a:t> </a:t>
+            </a:r>
+            <a:r>
+              <a:rPr lang="en-US" dirty="0" err="1" smtClean="0"/>
+              <a:t>zahtevne</a:t>
+            </a:r>
+            <a:r>
+              <a:rPr lang="en-US" dirty="0" smtClean="0"/>
+              <a:t> </a:t>
+            </a:r>
+            <a:r>
+              <a:rPr lang="en-US" dirty="0" err="1" smtClean="0"/>
+              <a:t>spletne</a:t>
+            </a:r>
+            <a:r>
+              <a:rPr lang="en-US" dirty="0" smtClean="0"/>
+              <a:t> </a:t>
+            </a:r>
+            <a:r>
+              <a:rPr lang="en-US" dirty="0" err="1" smtClean="0"/>
+              <a:t>aplikacije</a:t>
+            </a:r>
+            <a:endParaRPr lang="en-US" dirty="0" smtClean="0"/>
+          </a:p>
+          <a:p>
+            <a:r>
+              <a:rPr lang="en-US" dirty="0" smtClean="0"/>
+              <a:t>Babel - </a:t>
+            </a:r>
+            <a:r>
+              <a:rPr lang="en-US" dirty="0" err="1" smtClean="0"/>
+              <a:t>Podpiranje</a:t>
+            </a:r>
+            <a:r>
+              <a:rPr lang="en-US" dirty="0" smtClean="0"/>
+              <a:t> </a:t>
+            </a:r>
+            <a:r>
+              <a:rPr lang="en-US" dirty="0" err="1" smtClean="0"/>
+              <a:t>starih</a:t>
+            </a:r>
+            <a:r>
+              <a:rPr lang="en-US" dirty="0" smtClean="0"/>
+              <a:t> </a:t>
+            </a:r>
+            <a:r>
+              <a:rPr lang="en-US" dirty="0" err="1" smtClean="0"/>
+              <a:t>brskalnikov</a:t>
+            </a:r>
+            <a:endParaRPr lang="en-US" dirty="0" smtClean="0"/>
+          </a:p>
+          <a:p>
+            <a:r>
+              <a:rPr lang="en-US" dirty="0" err="1" smtClean="0"/>
+              <a:t>Nove</a:t>
+            </a:r>
+            <a:r>
+              <a:rPr lang="en-US" dirty="0" smtClean="0"/>
+              <a:t> </a:t>
+            </a:r>
+            <a:r>
+              <a:rPr lang="en-US" dirty="0" err="1" smtClean="0"/>
+              <a:t>funkcionalnosti</a:t>
+            </a:r>
+            <a:r>
+              <a:rPr lang="en-US" dirty="0"/>
+              <a:t> </a:t>
+            </a:r>
+            <a:r>
+              <a:rPr lang="en-US" dirty="0" smtClean="0"/>
+              <a:t>(“syntactic sugar”)</a:t>
+            </a:r>
+          </a:p>
+          <a:p>
+            <a:endParaRPr lang="en-US" dirty="0"/>
+          </a:p>
+          <a:p>
+            <a:endParaRPr lang="en-US" dirty="0"/>
+          </a:p>
+        </p:txBody>
+      </p:sp>
+    </p:spTree>
+    <p:extLst>
+      <p:ext uri="{BB962C8B-B14F-4D97-AF65-F5344CB8AC3E}">
+        <p14:creationId xmlns:p14="http://schemas.microsoft.com/office/powerpoint/2010/main" val="1875459914"/>
       </p:ext>
     </p:extLst>
   </p:cSld>
@@ -7768,7 +8010,7 @@
 </p:sld>
 </file>
 
-<file path=ppt/slides/slide3.xml><?xml version="1.0" encoding="utf-8"?>
+<file path=ppt/slides/slide4.xml><?xml version="1.0" encoding="utf-8"?>
 <p:sld xmlns:a="http://schemas.openxmlformats.org/drawingml/2006/main" xmlns:r="http://schemas.openxmlformats.org/officeDocument/2006/relationships" xmlns:p="http://schemas.openxmlformats.org/presentationml/2006/main">
   <p:cSld>
     <p:spTree>
@@ -8139,7 +8381,7 @@
 </p:sld>
 </file>
 
-<file path=ppt/slides/slide4.xml><?xml version="1.0" encoding="utf-8"?>
+<file path=ppt/slides/slide5.xml><?xml version="1.0" encoding="utf-8"?>
 <p:sld xmlns:a="http://schemas.openxmlformats.org/drawingml/2006/main" xmlns:r="http://schemas.openxmlformats.org/officeDocument/2006/relationships" xmlns:p="http://schemas.openxmlformats.org/presentationml/2006/main">
   <p:cSld>
     <p:spTree>
@@ -8509,7 +8751,7 @@
 </p:sld>
 </file>
 
-<file path=ppt/slides/slide5.xml><?xml version="1.0" encoding="utf-8"?>
+<file path=ppt/slides/slide6.xml><?xml version="1.0" encoding="utf-8"?>
 <p:sld xmlns:a="http://schemas.openxmlformats.org/drawingml/2006/main" xmlns:r="http://schemas.openxmlformats.org/officeDocument/2006/relationships" xmlns:p="http://schemas.openxmlformats.org/presentationml/2006/main">
   <p:cSld>
     <p:spTree>
@@ -8768,7 +9010,7 @@
 </p:sld>
 </file>
 
-<file path=ppt/slides/slide6.xml><?xml version="1.0" encoding="utf-8"?>
+<file path=ppt/slides/slide7.xml><?xml version="1.0" encoding="utf-8"?>
 <p:sld xmlns:a="http://schemas.openxmlformats.org/drawingml/2006/main" xmlns:r="http://schemas.openxmlformats.org/officeDocument/2006/relationships" xmlns:p="http://schemas.openxmlformats.org/presentationml/2006/main">
   <p:cSld>
     <p:spTree>
@@ -9027,7 +9269,7 @@
 </p:sld>
 </file>
 
-<file path=ppt/slides/slide7.xml><?xml version="1.0" encoding="utf-8"?>
+<file path=ppt/slides/slide8.xml><?xml version="1.0" encoding="utf-8"?>
 <p:sld xmlns:a="http://schemas.openxmlformats.org/drawingml/2006/main" xmlns:r="http://schemas.openxmlformats.org/officeDocument/2006/relationships" xmlns:p="http://schemas.openxmlformats.org/presentationml/2006/main">
   <p:cSld>
     <p:spTree>
@@ -9206,7 +9448,7 @@
 </p:sld>
 </file>
 
-<file path=ppt/slides/slide8.xml><?xml version="1.0" encoding="utf-8"?>
+<file path=ppt/slides/slide9.xml><?xml version="1.0" encoding="utf-8"?>
 <p:sld xmlns:a="http://schemas.openxmlformats.org/drawingml/2006/main" xmlns:r="http://schemas.openxmlformats.org/officeDocument/2006/relationships" xmlns:p="http://schemas.openxmlformats.org/presentationml/2006/main">
   <p:cSld>
     <p:spTree>
@@ -9370,293 +9612,6 @@
         </p:cTn>
       </p:par>
     </p:tnLst>
-  </p:timing>
-</p:sld>
-</file>
-
-<file path=ppt/slides/slide9.xml><?xml version="1.0" encoding="utf-8"?>
-<p:sld xmlns:a="http://schemas.openxmlformats.org/drawingml/2006/main" xmlns:r="http://schemas.openxmlformats.org/officeDocument/2006/relationships" xmlns:p="http://schemas.openxmlformats.org/presentationml/2006/main">
-  <p:cSld>
-    <p:spTree>
-      <p:nvGrpSpPr>
-        <p:cNvPr id="1" name=""/>
-        <p:cNvGrpSpPr/>
-        <p:nvPr/>
-      </p:nvGrpSpPr>
-      <p:grpSpPr>
-        <a:xfrm>
-          <a:off x="0" y="0"/>
-          <a:ext cx="0" cy="0"/>
-          <a:chOff x="0" y="0"/>
-          <a:chExt cx="0" cy="0"/>
-        </a:xfrm>
-      </p:grpSpPr>
-      <p:sp>
-        <p:nvSpPr>
-          <p:cNvPr id="2" name="Title 1"/>
-          <p:cNvSpPr>
-            <a:spLocks noGrp="1"/>
-          </p:cNvSpPr>
-          <p:nvPr>
-            <p:ph type="title"/>
-          </p:nvPr>
-        </p:nvSpPr>
-        <p:spPr/>
-        <p:txBody>
-          <a:bodyPr/>
-          <a:lstStyle/>
-          <a:p>
-            <a:r>
-              <a:rPr lang="en-US" dirty="0" smtClean="0"/>
-              <a:t>React</a:t>
-            </a:r>
-            <a:endParaRPr lang="en-US" dirty="0"/>
-          </a:p>
-        </p:txBody>
-      </p:sp>
-      <p:sp>
-        <p:nvSpPr>
-          <p:cNvPr id="7" name="Content Placeholder 6"/>
-          <p:cNvSpPr>
-            <a:spLocks noGrp="1"/>
-          </p:cNvSpPr>
-          <p:nvPr>
-            <p:ph idx="1"/>
-          </p:nvPr>
-        </p:nvSpPr>
-        <p:spPr/>
-        <p:txBody>
-          <a:bodyPr/>
-          <a:lstStyle/>
-          <a:p>
-            <a:r>
-              <a:rPr lang="en-US" dirty="0" smtClean="0"/>
-              <a:t>“View” v “MVC” </a:t>
-            </a:r>
-            <a:r>
-              <a:rPr lang="en-US" dirty="0" err="1" smtClean="0"/>
-              <a:t>modelu</a:t>
-            </a:r>
-            <a:endParaRPr lang="en-US" dirty="0" smtClean="0"/>
-          </a:p>
-          <a:p>
-            <a:r>
-              <a:rPr lang="en-US" dirty="0" smtClean="0"/>
-              <a:t>Ne </a:t>
-            </a:r>
-            <a:r>
-              <a:rPr lang="en-US" dirty="0" err="1" smtClean="0"/>
-              <a:t>potrebuje</a:t>
-            </a:r>
-            <a:r>
-              <a:rPr lang="en-US" dirty="0" smtClean="0"/>
-              <a:t> DOM-a (</a:t>
-            </a:r>
-            <a:r>
-              <a:rPr lang="en-US" dirty="0" err="1" smtClean="0"/>
-              <a:t>deluje</a:t>
-            </a:r>
-            <a:r>
-              <a:rPr lang="en-US" dirty="0" smtClean="0"/>
-              <a:t> </a:t>
-            </a:r>
-            <a:r>
-              <a:rPr lang="en-US" dirty="0" err="1" smtClean="0"/>
-              <a:t>na</a:t>
-            </a:r>
-            <a:r>
-              <a:rPr lang="en-US" dirty="0" smtClean="0"/>
-              <a:t> </a:t>
-            </a:r>
-            <a:r>
-              <a:rPr lang="en-US" dirty="0" err="1" smtClean="0"/>
-              <a:t>serverju</a:t>
-            </a:r>
-            <a:r>
-              <a:rPr lang="en-US" dirty="0" smtClean="0"/>
-              <a:t>)</a:t>
-            </a:r>
-          </a:p>
-          <a:p>
-            <a:r>
-              <a:rPr lang="en-US" dirty="0" smtClean="0"/>
-              <a:t>Virtual DOM</a:t>
-            </a:r>
-          </a:p>
-          <a:p>
-            <a:pPr lvl="1"/>
-            <a:r>
-              <a:rPr lang="en-US" dirty="0" err="1" smtClean="0"/>
-              <a:t>čim</a:t>
-            </a:r>
-            <a:r>
-              <a:rPr lang="en-US" dirty="0" smtClean="0"/>
-              <a:t> </a:t>
-            </a:r>
-            <a:r>
-              <a:rPr lang="en-US" dirty="0" err="1" smtClean="0"/>
-              <a:t>manj</a:t>
-            </a:r>
-            <a:r>
-              <a:rPr lang="en-US" dirty="0" smtClean="0"/>
-              <a:t> </a:t>
-            </a:r>
-            <a:r>
-              <a:rPr lang="en-US" dirty="0" err="1" smtClean="0"/>
-              <a:t>interakcij</a:t>
-            </a:r>
-            <a:r>
-              <a:rPr lang="en-US" dirty="0" smtClean="0"/>
-              <a:t> z DOM-om</a:t>
-            </a:r>
-          </a:p>
-          <a:p>
-            <a:pPr lvl="1"/>
-            <a:r>
-              <a:rPr lang="en-US" dirty="0" err="1" smtClean="0"/>
-              <a:t>elementi</a:t>
-            </a:r>
-            <a:r>
-              <a:rPr lang="en-US" dirty="0" smtClean="0"/>
-              <a:t> </a:t>
-            </a:r>
-            <a:r>
-              <a:rPr lang="en-US" dirty="0" err="1" smtClean="0"/>
-              <a:t>predstavljeni</a:t>
-            </a:r>
-            <a:r>
-              <a:rPr lang="en-US" dirty="0" smtClean="0"/>
-              <a:t> </a:t>
-            </a:r>
-            <a:r>
-              <a:rPr lang="en-US" dirty="0" err="1" smtClean="0"/>
-              <a:t>kot</a:t>
-            </a:r>
-            <a:r>
-              <a:rPr lang="en-US" dirty="0" smtClean="0"/>
-              <a:t> </a:t>
-            </a:r>
-            <a:r>
-              <a:rPr lang="en-US" dirty="0" err="1" smtClean="0"/>
-              <a:t>objekti</a:t>
-            </a:r>
-            <a:endParaRPr lang="en-US" dirty="0"/>
-          </a:p>
-          <a:p>
-            <a:pPr marL="345597" lvl="1" indent="0">
-              <a:buNone/>
-            </a:pPr>
-            <a:r>
-              <a:rPr lang="en-US" dirty="0" smtClean="0"/>
-              <a:t> </a:t>
-            </a:r>
-          </a:p>
-          <a:p>
-            <a:pPr marL="345597" lvl="1" indent="0">
-              <a:buNone/>
-            </a:pPr>
-            <a:endParaRPr lang="en-US" dirty="0"/>
-          </a:p>
-        </p:txBody>
-      </p:sp>
-    </p:spTree>
-    <p:extLst>
-      <p:ext uri="{BB962C8B-B14F-4D97-AF65-F5344CB8AC3E}">
-        <p14:creationId xmlns:p14="http://schemas.microsoft.com/office/powerpoint/2010/main" val="23272241"/>
-      </p:ext>
-    </p:extLst>
-  </p:cSld>
-  <p:clrMapOvr>
-    <a:masterClrMapping/>
-  </p:clrMapOvr>
-  <p:timing>
-    <p:tnLst>
-      <p:par>
-        <p:cTn id="1" dur="indefinite" restart="never" nodeType="tmRoot">
-          <p:childTnLst>
-            <p:seq concurrent="1" nextAc="seek">
-              <p:cTn id="2" dur="indefinite" nodeType="mainSeq">
-                <p:childTnLst>
-                  <p:par>
-                    <p:cTn id="3" fill="hold">
-                      <p:stCondLst>
-                        <p:cond delay="indefinite"/>
-                        <p:cond evt="onBegin" delay="0">
-                          <p:tn val="2"/>
-                        </p:cond>
-                      </p:stCondLst>
-                      <p:childTnLst>
-                        <p:par>
-                          <p:cTn id="4" fill="hold">
-                            <p:stCondLst>
-                              <p:cond delay="0"/>
-                            </p:stCondLst>
-                            <p:childTnLst>
-                              <p:par>
-                                <p:cTn id="5" presetID="18" presetClass="entr" presetSubtype="12" fill="hold" grpId="0" nodeType="afterEffect">
-                                  <p:stCondLst>
-                                    <p:cond delay="0"/>
-                                  </p:stCondLst>
-                                  <p:childTnLst>
-                                    <p:set>
-                                      <p:cBhvr>
-                                        <p:cTn id="6" dur="1" fill="hold">
-                                          <p:stCondLst>
-                                            <p:cond delay="0"/>
-                                          </p:stCondLst>
-                                        </p:cTn>
-                                        <p:tgtEl>
-                                          <p:spTgt spid="2"/>
-                                        </p:tgtEl>
-                                        <p:attrNameLst>
-                                          <p:attrName>style.visibility</p:attrName>
-                                        </p:attrNameLst>
-                                      </p:cBhvr>
-                                      <p:to>
-                                        <p:strVal val="visible"/>
-                                      </p:to>
-                                    </p:set>
-                                    <p:animEffect transition="in" filter="strips(downLeft)">
-                                      <p:cBhvr>
-                                        <p:cTn id="7" dur="500"/>
-                                        <p:tgtEl>
-                                          <p:spTgt spid="2"/>
-                                        </p:tgtEl>
-                                      </p:cBhvr>
-                                    </p:animEffect>
-                                  </p:childTnLst>
-                                </p:cTn>
-                              </p:par>
-                            </p:childTnLst>
-                          </p:cTn>
-                        </p:par>
-                      </p:childTnLst>
-                    </p:cTn>
-                  </p:par>
-                </p:childTnLst>
-              </p:cTn>
-              <p:prevCondLst>
-                <p:cond evt="onPrev" delay="0">
-                  <p:tgtEl>
-                    <p:sldTgt/>
-                  </p:tgtEl>
-                </p:cond>
-              </p:prevCondLst>
-              <p:nextCondLst>
-                <p:cond evt="onNext" delay="0">
-                  <p:tgtEl>
-                    <p:sldTgt/>
-                  </p:tgtEl>
-                </p:cond>
-              </p:nextCondLst>
-            </p:seq>
-          </p:childTnLst>
-        </p:cTn>
-      </p:par>
-    </p:tnLst>
-    <p:bldLst>
-      <p:bldP spid="2" grpId="0"/>
-    </p:bldLst>
   </p:timing>
 </p:sld>
 </file>

</xml_diff>